<commit_message>
Updated with Marlann's suggestions
</commit_message>
<xml_diff>
--- a/PhyME - ASAP ME SP25 Abbreviated Slides.pptx
+++ b/PhyME - ASAP ME SP25 Abbreviated Slides.pptx
@@ -209,7 +209,7 @@
           <a:p>
             <a:fld id="{2C0D99EB-916F-CC4E-B11B-B666F8EDD2C2}" type="datetimeFigureOut">
               <a:rPr lang="en-US" smtClean="0"/>
-              <a:t>3/31/25</a:t>
+              <a:t>4/1/25</a:t>
             </a:fld>
             <a:endParaRPr lang="en-US"/>
           </a:p>
@@ -605,7 +605,7 @@
           <a:p>
             <a:fld id="{55ABCCAE-6FBF-3E41-BA51-419B2EC9975B}" type="datetimeFigureOut">
               <a:rPr lang="en-US" smtClean="0"/>
-              <a:t>3/31/25</a:t>
+              <a:t>4/1/25</a:t>
             </a:fld>
             <a:endParaRPr lang="en-US"/>
           </a:p>
@@ -773,7 +773,7 @@
           <a:p>
             <a:fld id="{55ABCCAE-6FBF-3E41-BA51-419B2EC9975B}" type="datetimeFigureOut">
               <a:rPr lang="en-US" smtClean="0"/>
-              <a:t>3/31/25</a:t>
+              <a:t>4/1/25</a:t>
             </a:fld>
             <a:endParaRPr lang="en-US"/>
           </a:p>
@@ -951,7 +951,7 @@
           <a:p>
             <a:fld id="{55ABCCAE-6FBF-3E41-BA51-419B2EC9975B}" type="datetimeFigureOut">
               <a:rPr lang="en-US" smtClean="0"/>
-              <a:t>3/31/25</a:t>
+              <a:t>4/1/25</a:t>
             </a:fld>
             <a:endParaRPr lang="en-US"/>
           </a:p>
@@ -1119,7 +1119,7 @@
           <a:p>
             <a:fld id="{55ABCCAE-6FBF-3E41-BA51-419B2EC9975B}" type="datetimeFigureOut">
               <a:rPr lang="en-US" smtClean="0"/>
-              <a:t>3/31/25</a:t>
+              <a:t>4/1/25</a:t>
             </a:fld>
             <a:endParaRPr lang="en-US"/>
           </a:p>
@@ -1364,7 +1364,7 @@
           <a:p>
             <a:fld id="{55ABCCAE-6FBF-3E41-BA51-419B2EC9975B}" type="datetimeFigureOut">
               <a:rPr lang="en-US" smtClean="0"/>
-              <a:t>3/31/25</a:t>
+              <a:t>4/1/25</a:t>
             </a:fld>
             <a:endParaRPr lang="en-US"/>
           </a:p>
@@ -1593,7 +1593,7 @@
           <a:p>
             <a:fld id="{55ABCCAE-6FBF-3E41-BA51-419B2EC9975B}" type="datetimeFigureOut">
               <a:rPr lang="en-US" smtClean="0"/>
-              <a:t>3/31/25</a:t>
+              <a:t>4/1/25</a:t>
             </a:fld>
             <a:endParaRPr lang="en-US"/>
           </a:p>
@@ -1957,7 +1957,7 @@
           <a:p>
             <a:fld id="{55ABCCAE-6FBF-3E41-BA51-419B2EC9975B}" type="datetimeFigureOut">
               <a:rPr lang="en-US" smtClean="0"/>
-              <a:t>3/31/25</a:t>
+              <a:t>4/1/25</a:t>
             </a:fld>
             <a:endParaRPr lang="en-US"/>
           </a:p>
@@ -2074,7 +2074,7 @@
           <a:p>
             <a:fld id="{55ABCCAE-6FBF-3E41-BA51-419B2EC9975B}" type="datetimeFigureOut">
               <a:rPr lang="en-US" smtClean="0"/>
-              <a:t>3/31/25</a:t>
+              <a:t>4/1/25</a:t>
             </a:fld>
             <a:endParaRPr lang="en-US"/>
           </a:p>
@@ -2169,7 +2169,7 @@
           <a:p>
             <a:fld id="{55ABCCAE-6FBF-3E41-BA51-419B2EC9975B}" type="datetimeFigureOut">
               <a:rPr lang="en-US" smtClean="0"/>
-              <a:t>3/31/25</a:t>
+              <a:t>4/1/25</a:t>
             </a:fld>
             <a:endParaRPr lang="en-US"/>
           </a:p>
@@ -2444,7 +2444,7 @@
           <a:p>
             <a:fld id="{55ABCCAE-6FBF-3E41-BA51-419B2EC9975B}" type="datetimeFigureOut">
               <a:rPr lang="en-US" smtClean="0"/>
-              <a:t>3/31/25</a:t>
+              <a:t>4/1/25</a:t>
             </a:fld>
             <a:endParaRPr lang="en-US"/>
           </a:p>
@@ -2696,7 +2696,7 @@
           <a:p>
             <a:fld id="{55ABCCAE-6FBF-3E41-BA51-419B2EC9975B}" type="datetimeFigureOut">
               <a:rPr lang="en-US" smtClean="0"/>
-              <a:t>3/31/25</a:t>
+              <a:t>4/1/25</a:t>
             </a:fld>
             <a:endParaRPr lang="en-US"/>
           </a:p>
@@ -2907,7 +2907,7 @@
           <a:p>
             <a:fld id="{55ABCCAE-6FBF-3E41-BA51-419B2EC9975B}" type="datetimeFigureOut">
               <a:rPr lang="en-US" smtClean="0"/>
-              <a:t>3/31/25</a:t>
+              <a:t>4/1/25</a:t>
             </a:fld>
             <a:endParaRPr lang="en-US"/>
           </a:p>
@@ -3298,6 +3298,16 @@
 <file path=ppt/slides/slide1.xml><?xml version="1.0" encoding="utf-8"?>
 <p:sld xmlns:a="http://schemas.openxmlformats.org/drawingml/2006/main" xmlns:r="http://schemas.openxmlformats.org/officeDocument/2006/relationships" xmlns:p="http://schemas.openxmlformats.org/presentationml/2006/main">
   <p:cSld>
+    <p:bg>
+      <p:bgPr>
+        <a:solidFill>
+          <a:schemeClr val="accent5">
+            <a:lumMod val="50000"/>
+          </a:schemeClr>
+        </a:solidFill>
+        <a:effectLst/>
+      </p:bgPr>
+    </p:bg>
     <p:spTree>
       <p:nvGrpSpPr>
         <p:cNvPr id="1" name=""/>
@@ -3314,18 +3324,144 @@
       </p:grpSpPr>
       <p:sp>
         <p:nvSpPr>
-          <p:cNvPr id="2" name="Title 1"/>
+          <p:cNvPr id="19" name="Title 18">
+            <a:extLst>
+              <a:ext uri="{FF2B5EF4-FFF2-40B4-BE49-F238E27FC236}">
+                <a16:creationId xmlns:a16="http://schemas.microsoft.com/office/drawing/2014/main" id="{846CFC2E-23A4-80EB-C225-51ABF53BB3F2}"/>
+              </a:ext>
+            </a:extLst>
+          </p:cNvPr>
           <p:cNvSpPr>
             <a:spLocks noGrp="1"/>
           </p:cNvSpPr>
           <p:nvPr>
             <p:ph type="title"/>
+          </p:nvPr>
+        </p:nvSpPr>
+        <p:spPr/>
+        <p:txBody>
+          <a:bodyPr anchor="t">
+            <a:normAutofit fontScale="90000"/>
+          </a:bodyPr>
+          <a:lstStyle/>
+          <a:p>
+            <a:pPr algn="ctr"/>
+            <a:r>
+              <a:rPr lang="en-US" sz="4000" b="1" dirty="0">
+                <a:solidFill>
+                  <a:srgbClr val="FFFFFF"/>
+                </a:solidFill>
+              </a:rPr>
+              <a:t>Like Physics?  </a:t>
+            </a:r>
+            <a:br>
+              <a:rPr lang="en-US" sz="4000" b="1" dirty="0">
+                <a:solidFill>
+                  <a:srgbClr val="FFFFFF"/>
+                </a:solidFill>
+              </a:rPr>
+            </a:br>
+            <a:r>
+              <a:rPr lang="en-US" sz="2700" b="1" dirty="0">
+                <a:solidFill>
+                  <a:srgbClr val="FFFFFF"/>
+                </a:solidFill>
+              </a:rPr>
+              <a:t>Options for Mechanical Engineering Majors</a:t>
+            </a:r>
+            <a:br>
+              <a:rPr lang="en-US" sz="2700" b="1" dirty="0">
+                <a:solidFill>
+                  <a:srgbClr val="FFFFFF"/>
+                </a:solidFill>
+              </a:rPr>
+            </a:br>
+            <a:br>
+              <a:rPr lang="en-US" sz="2700" b="1" dirty="0">
+                <a:solidFill>
+                  <a:srgbClr val="FFFFFF"/>
+                </a:solidFill>
+              </a:rPr>
+            </a:br>
+            <a:r>
+              <a:rPr lang="en-US" sz="1800" dirty="0">
+                <a:solidFill>
+                  <a:srgbClr val="FFFFFF"/>
+                </a:solidFill>
+              </a:rPr>
+              <a:t>Prof. Zimmerman: </a:t>
+            </a:r>
+            <a:r>
+              <a:rPr lang="en-US" sz="1800" dirty="0">
+                <a:solidFill>
+                  <a:srgbClr val="FFFFFF"/>
+                </a:solidFill>
+                <a:hlinkClick r:id="rId2"/>
+              </a:rPr>
+              <a:t>zimmermant@uwstout.edu</a:t>
+            </a:r>
+            <a:endParaRPr lang="en-US" sz="2700" dirty="0">
+              <a:solidFill>
+                <a:srgbClr val="FFFFFF"/>
+              </a:solidFill>
+            </a:endParaRPr>
+          </a:p>
+        </p:txBody>
+      </p:sp>
+      <p:sp>
+        <p:nvSpPr>
+          <p:cNvPr id="43" name="Text Placeholder 42">
+            <a:extLst>
+              <a:ext uri="{FF2B5EF4-FFF2-40B4-BE49-F238E27FC236}">
+                <a16:creationId xmlns:a16="http://schemas.microsoft.com/office/drawing/2014/main" id="{5A856F58-B65F-6908-1491-7E5DF8DADECB}"/>
+              </a:ext>
+            </a:extLst>
+          </p:cNvPr>
+          <p:cNvSpPr>
+            <a:spLocks noGrp="1"/>
+          </p:cNvSpPr>
+          <p:nvPr>
+            <p:ph type="body" idx="1"/>
           </p:nvPr>
         </p:nvSpPr>
         <p:spPr>
           <a:xfrm>
-            <a:off x="5415684" y="910343"/>
-            <a:ext cx="5562599" cy="1286758"/>
+            <a:off x="839788" y="1681163"/>
+            <a:ext cx="5157787" cy="823912"/>
+          </a:xfrm>
+        </p:spPr>
+        <p:txBody>
+          <a:bodyPr/>
+          <a:lstStyle/>
+          <a:p>
+            <a:r>
+              <a:rPr lang="en-US" sz="2400" b="1" dirty="0"/>
+              <a:t>Physics Major</a:t>
+            </a:r>
+            <a:endParaRPr lang="en-US" dirty="0"/>
+          </a:p>
+        </p:txBody>
+      </p:sp>
+      <p:sp>
+        <p:nvSpPr>
+          <p:cNvPr id="20" name="Content Placeholder 19">
+            <a:extLst>
+              <a:ext uri="{FF2B5EF4-FFF2-40B4-BE49-F238E27FC236}">
+                <a16:creationId xmlns:a16="http://schemas.microsoft.com/office/drawing/2014/main" id="{609878AF-8537-5543-98ED-D76F3026C4D8}"/>
+              </a:ext>
+            </a:extLst>
+          </p:cNvPr>
+          <p:cNvSpPr>
+            <a:spLocks noGrp="1"/>
+          </p:cNvSpPr>
+          <p:nvPr>
+            <p:ph sz="half" idx="2"/>
+          </p:nvPr>
+        </p:nvSpPr>
+        <p:spPr>
+          <a:xfrm>
+            <a:off x="839788" y="2505075"/>
+            <a:ext cx="5157787" cy="3684588"/>
           </a:xfrm>
         </p:spPr>
         <p:txBody>
@@ -3334,826 +3470,362 @@
           </a:bodyPr>
           <a:lstStyle/>
           <a:p>
-            <a:pPr algn="ctr"/>
-            <a:r>
-              <a:rPr lang="en-US" dirty="0">
-                <a:solidFill>
-                  <a:srgbClr val="FFFFFF"/>
-                </a:solidFill>
-              </a:rPr>
-              <a:t>Physics at UW-Stout</a:t>
-            </a:r>
-          </a:p>
-        </p:txBody>
-      </p:sp>
-      <p:sp>
-        <p:nvSpPr>
-          <p:cNvPr id="3" name="Content Placeholder 2"/>
-          <p:cNvSpPr>
-            <a:spLocks noGrp="1"/>
-          </p:cNvSpPr>
-          <p:nvPr>
-            <p:ph idx="1"/>
-          </p:nvPr>
-        </p:nvSpPr>
-        <p:spPr>
-          <a:xfrm>
-            <a:off x="5823781" y="5897471"/>
-            <a:ext cx="3606624" cy="923330"/>
-          </a:xfrm>
-        </p:spPr>
-        <p:txBody>
-          <a:bodyPr>
-            <a:normAutofit fontScale="85000" lnSpcReduction="20000"/>
-          </a:bodyPr>
-          <a:lstStyle/>
-          <a:p>
-            <a:pPr marL="0" indent="0" algn="ctr">
+            <a:pPr marL="0" indent="0">
               <a:buNone/>
             </a:pPr>
             <a:r>
-              <a:rPr lang="en-US" dirty="0">
-                <a:solidFill>
-                  <a:srgbClr val="FFFFFF"/>
-                </a:solidFill>
-              </a:rPr>
-              <a:t>Lasers, Optics, Plasmas, Computational Modeling, and Quantum Computers</a:t>
-            </a:r>
-          </a:p>
-        </p:txBody>
-      </p:sp>
-      <p:sp>
-        <p:nvSpPr>
-          <p:cNvPr id="10" name="Rectangle 9">
+              <a:rPr lang="en-US" sz="1400" b="1" dirty="0"/>
+              <a:t>(~30 cr. beyond ME requirements)</a:t>
+            </a:r>
+          </a:p>
+          <a:p>
+            <a:pPr marL="742950" lvl="1" indent="-285750">
+              <a:buFont typeface="Arial" panose="020B0604020202020204" pitchFamily="34" charset="0"/>
+              <a:buChar char="•"/>
+            </a:pPr>
+            <a:r>
+              <a:rPr lang="en-US" sz="1400" dirty="0"/>
+              <a:t>Intro to Physics Research</a:t>
+            </a:r>
+          </a:p>
+          <a:p>
+            <a:pPr marL="742950" lvl="1" indent="-285750">
+              <a:buFont typeface="Arial" panose="020B0604020202020204" pitchFamily="34" charset="0"/>
+              <a:buChar char="•"/>
+            </a:pPr>
+            <a:r>
+              <a:rPr lang="en-US" sz="1400" dirty="0"/>
+              <a:t>Intro to Quantum Mechanics</a:t>
+            </a:r>
+          </a:p>
+          <a:p>
+            <a:pPr marL="742950" lvl="1" indent="-285750">
+              <a:buFont typeface="Arial" panose="020B0604020202020204" pitchFamily="34" charset="0"/>
+              <a:buChar char="•"/>
+            </a:pPr>
+            <a:r>
+              <a:rPr lang="en-US" sz="1400" dirty="0"/>
+              <a:t>Computational Classical Physics</a:t>
+            </a:r>
+          </a:p>
+          <a:p>
+            <a:pPr marL="742950" lvl="1" indent="-285750">
+              <a:buFont typeface="Arial" panose="020B0604020202020204" pitchFamily="34" charset="0"/>
+              <a:buChar char="•"/>
+            </a:pPr>
+            <a:r>
+              <a:rPr lang="en-US" sz="1400" dirty="0"/>
+              <a:t>Solid State Physics</a:t>
+            </a:r>
+          </a:p>
+          <a:p>
+            <a:pPr marL="742950" lvl="1" indent="-285750">
+              <a:buFont typeface="Arial" panose="020B0604020202020204" pitchFamily="34" charset="0"/>
+              <a:buChar char="•"/>
+            </a:pPr>
+            <a:r>
+              <a:rPr lang="en-US" sz="1400" dirty="0"/>
+              <a:t>Applied Optics and Photonics</a:t>
+            </a:r>
+          </a:p>
+          <a:p>
+            <a:pPr marL="742950" lvl="1" indent="-285750">
+              <a:buFont typeface="Arial" panose="020B0604020202020204" pitchFamily="34" charset="0"/>
+              <a:buChar char="•"/>
+            </a:pPr>
+            <a:r>
+              <a:rPr lang="en-US" sz="1400" dirty="0"/>
+              <a:t>Advanced Physics Lab</a:t>
+            </a:r>
+          </a:p>
+          <a:p>
+            <a:pPr marL="742950" lvl="1" indent="-285750">
+              <a:buFont typeface="Arial" panose="020B0604020202020204" pitchFamily="34" charset="0"/>
+              <a:buChar char="•"/>
+            </a:pPr>
+            <a:r>
+              <a:rPr lang="en-US" sz="1400" dirty="0"/>
+              <a:t>Quantum Mechanics</a:t>
+            </a:r>
+          </a:p>
+          <a:p>
+            <a:pPr marL="742950" lvl="1" indent="-285750">
+              <a:buFont typeface="Arial" panose="020B0604020202020204" pitchFamily="34" charset="0"/>
+              <a:buChar char="•"/>
+            </a:pPr>
+            <a:r>
+              <a:rPr lang="en-US" sz="1400" dirty="0"/>
+              <a:t>Applied Electromagnetics</a:t>
+            </a:r>
+          </a:p>
+          <a:p>
+            <a:pPr marL="742950" lvl="1" indent="-285750">
+              <a:buFont typeface="Arial" panose="020B0604020202020204" pitchFamily="34" charset="0"/>
+              <a:buChar char="•"/>
+            </a:pPr>
+            <a:r>
+              <a:rPr lang="en-US" sz="1400" dirty="0"/>
+              <a:t>Computer Science I and II</a:t>
+            </a:r>
+          </a:p>
+        </p:txBody>
+      </p:sp>
+      <p:sp>
+        <p:nvSpPr>
+          <p:cNvPr id="44" name="Text Placeholder 43">
             <a:extLst>
               <a:ext uri="{FF2B5EF4-FFF2-40B4-BE49-F238E27FC236}">
-                <a16:creationId xmlns:a16="http://schemas.microsoft.com/office/drawing/2014/main" id="{B14DD6CB-0B02-2558-D34F-EE4C43095D20}"/>
+                <a16:creationId xmlns:a16="http://schemas.microsoft.com/office/drawing/2014/main" id="{98CB7486-5D61-BD28-7A3B-3AE6C3871807}"/>
               </a:ext>
             </a:extLst>
           </p:cNvPr>
-          <p:cNvSpPr/>
-          <p:nvPr/>
+          <p:cNvSpPr>
+            <a:spLocks noGrp="1"/>
+          </p:cNvSpPr>
+          <p:nvPr>
+            <p:ph type="body" sz="quarter" idx="3"/>
+          </p:nvPr>
         </p:nvSpPr>
         <p:spPr>
           <a:xfrm>
-            <a:off x="3304815" y="-123227"/>
-            <a:ext cx="3738717" cy="1569660"/>
+            <a:off x="6096000" y="1681163"/>
+            <a:ext cx="5183188" cy="823912"/>
           </a:xfrm>
-          <a:prstGeom prst="rect">
-            <a:avLst/>
-          </a:prstGeom>
-          <a:noFill/>
         </p:spPr>
         <p:txBody>
-          <a:bodyPr wrap="none" lIns="91440" tIns="45720" rIns="91440" bIns="45720">
-            <a:spAutoFit/>
-            <a:scene3d>
-              <a:camera prst="orthographicFront"/>
-              <a:lightRig rig="soft" dir="t">
-                <a:rot lat="0" lon="0" rev="15600000"/>
-              </a:lightRig>
-            </a:scene3d>
-            <a:sp3d extrusionH="57150" prstMaterial="softEdge">
-              <a:bevelT w="25400" h="38100"/>
-            </a:sp3d>
-          </a:bodyPr>
+          <a:bodyPr/>
           <a:lstStyle/>
           <a:p>
-            <a:pPr algn="ctr"/>
-            <a:r>
-              <a:rPr lang="en-US" sz="9600" b="1" cap="none" spc="0" dirty="0" err="1">
-                <a:ln/>
-                <a:solidFill>
-                  <a:schemeClr val="accent4"/>
-                </a:solidFill>
-                <a:effectLst/>
-              </a:rPr>
-              <a:t>PhyME</a:t>
-            </a:r>
-            <a:endParaRPr lang="en-US" sz="5400" b="1" cap="none" spc="0" dirty="0">
-              <a:ln/>
-              <a:solidFill>
-                <a:schemeClr val="accent4"/>
-              </a:solidFill>
-              <a:effectLst/>
-            </a:endParaRPr>
-          </a:p>
-        </p:txBody>
-      </p:sp>
-      <p:sp>
-        <p:nvSpPr>
-          <p:cNvPr id="12" name="TextBox 11">
+            <a:r>
+              <a:rPr lang="en-US" sz="2400" b="1" dirty="0"/>
+              <a:t>Physics Minor</a:t>
+            </a:r>
+            <a:endParaRPr lang="en-US" sz="2400" dirty="0"/>
+          </a:p>
+        </p:txBody>
+      </p:sp>
+      <p:sp>
+        <p:nvSpPr>
+          <p:cNvPr id="22" name="Content Placeholder 21">
             <a:extLst>
               <a:ext uri="{FF2B5EF4-FFF2-40B4-BE49-F238E27FC236}">
-                <a16:creationId xmlns:a16="http://schemas.microsoft.com/office/drawing/2014/main" id="{0EDCB87F-BCAA-82EF-B636-6DCE2960B52F}"/>
+                <a16:creationId xmlns:a16="http://schemas.microsoft.com/office/drawing/2014/main" id="{606E7DDC-B919-F467-55E7-AA4DB70BA7E0}"/>
               </a:ext>
             </a:extLst>
           </p:cNvPr>
-          <p:cNvSpPr txBox="1"/>
-          <p:nvPr/>
+          <p:cNvSpPr>
+            <a:spLocks noGrp="1"/>
+          </p:cNvSpPr>
+          <p:nvPr>
+            <p:ph sz="quarter" idx="4"/>
+          </p:nvPr>
         </p:nvSpPr>
         <p:spPr>
           <a:xfrm>
-            <a:off x="3215849" y="1202419"/>
-            <a:ext cx="5215863" cy="830997"/>
+            <a:off x="6169024" y="2505075"/>
+            <a:ext cx="5183188" cy="3684588"/>
           </a:xfrm>
-          <a:prstGeom prst="rect">
-            <a:avLst/>
-          </a:prstGeom>
-          <a:noFill/>
         </p:spPr>
         <p:txBody>
-          <a:bodyPr wrap="square" rtlCol="0">
-            <a:spAutoFit/>
+          <a:bodyPr>
+            <a:normAutofit/>
           </a:bodyPr>
           <a:lstStyle/>
           <a:p>
-            <a:r>
-              <a:rPr lang="en-US" sz="2400" b="1" dirty="0">
-                <a:solidFill>
-                  <a:srgbClr val="7030A0"/>
-                </a:solidFill>
-              </a:rPr>
-              <a:t>Double-Major in Physics and Mechanical Engineering</a:t>
-            </a:r>
-          </a:p>
-        </p:txBody>
-      </p:sp>
-      <p:pic>
-        <p:nvPicPr>
-          <p:cNvPr id="4" name="Picture 3">
+            <a:pPr marL="0" indent="0">
+              <a:buNone/>
+            </a:pPr>
+            <a:r>
+              <a:rPr lang="en-US" sz="1400" b="1" dirty="0"/>
+              <a:t>(5 cr. beyond ME requirements)</a:t>
+            </a:r>
+          </a:p>
+          <a:p>
+            <a:pPr lvl="1"/>
+            <a:r>
+              <a:rPr lang="en-US" sz="1300" b="1" dirty="0"/>
+              <a:t>Statics</a:t>
+            </a:r>
+            <a:r>
+              <a:rPr lang="en-US" sz="1300" dirty="0"/>
+              <a:t> and </a:t>
+            </a:r>
+            <a:r>
+              <a:rPr lang="en-US" sz="1300" b="1" dirty="0"/>
+              <a:t>Dynamics</a:t>
+            </a:r>
+            <a:r>
+              <a:rPr lang="en-US" sz="1300" dirty="0"/>
+              <a:t> </a:t>
+            </a:r>
+            <a:r>
+              <a:rPr lang="en-US" sz="1300" u="sng" dirty="0"/>
+              <a:t>or</a:t>
+            </a:r>
+            <a:r>
+              <a:rPr lang="en-US" sz="1300" dirty="0"/>
+              <a:t> University Physics I</a:t>
+            </a:r>
+          </a:p>
+          <a:p>
+            <a:pPr lvl="1"/>
+            <a:r>
+              <a:rPr lang="en-US" sz="1300" b="1" dirty="0"/>
+              <a:t>University Physics II</a:t>
+            </a:r>
+          </a:p>
+          <a:p>
+            <a:pPr lvl="1"/>
+            <a:r>
+              <a:rPr lang="en-US" sz="1300" dirty="0"/>
+              <a:t>11 credits from the following:</a:t>
+            </a:r>
+          </a:p>
+          <a:p>
+            <a:pPr lvl="2"/>
+            <a:r>
+              <a:rPr lang="en-US" sz="1300" dirty="0"/>
+              <a:t>PHYS-139 Intro to Research</a:t>
+            </a:r>
+          </a:p>
+          <a:p>
+            <a:pPr lvl="2"/>
+            <a:r>
+              <a:rPr lang="en-US" sz="1300" b="1" dirty="0"/>
+              <a:t>CEE-355</a:t>
+            </a:r>
+            <a:r>
+              <a:rPr lang="en-US" sz="1300" dirty="0"/>
+              <a:t> Applied E&amp;M</a:t>
+            </a:r>
+          </a:p>
+          <a:p>
+            <a:pPr lvl="2"/>
+            <a:r>
+              <a:rPr lang="en-US" sz="1300" dirty="0"/>
+              <a:t>Any PHYS-3XX</a:t>
+            </a:r>
+          </a:p>
+          <a:p>
+            <a:pPr lvl="2"/>
+            <a:r>
+              <a:rPr lang="en-US" sz="1300" dirty="0"/>
+              <a:t>Thermodynamics (PHYS-222 </a:t>
+            </a:r>
+            <a:r>
+              <a:rPr lang="en-US" sz="1300" u="sng" dirty="0"/>
+              <a:t>or</a:t>
+            </a:r>
+            <a:r>
+              <a:rPr lang="en-US" sz="1300" dirty="0"/>
+              <a:t> </a:t>
+            </a:r>
+            <a:r>
+              <a:rPr lang="en-US" sz="1300" b="1" dirty="0"/>
+              <a:t>ENGR-275</a:t>
+            </a:r>
+            <a:r>
+              <a:rPr lang="en-US" sz="1300" dirty="0"/>
+              <a:t> </a:t>
+            </a:r>
+            <a:r>
+              <a:rPr lang="en-US" sz="1300" u="sng" dirty="0"/>
+              <a:t>or</a:t>
+            </a:r>
+            <a:r>
+              <a:rPr lang="en-US" sz="1300" dirty="0"/>
+              <a:t> ME-390)</a:t>
+            </a:r>
+          </a:p>
+        </p:txBody>
+      </p:sp>
+      <p:grpSp>
+        <p:nvGrpSpPr>
+          <p:cNvPr id="31" name="Group 30">
             <a:extLst>
               <a:ext uri="{FF2B5EF4-FFF2-40B4-BE49-F238E27FC236}">
-                <a16:creationId xmlns:a16="http://schemas.microsoft.com/office/drawing/2014/main" id="{0D529C91-C3AB-4FDE-7F42-EE46AAC763ED}"/>
+                <a16:creationId xmlns:a16="http://schemas.microsoft.com/office/drawing/2014/main" id="{159E0A26-AACB-4004-ED69-997E918EF0E8}"/>
               </a:ext>
             </a:extLst>
           </p:cNvPr>
-          <p:cNvPicPr>
-            <a:picLocks noChangeAspect="1"/>
-          </p:cNvPicPr>
+          <p:cNvGrpSpPr/>
           <p:nvPr/>
-        </p:nvPicPr>
-        <p:blipFill>
-          <a:blip r:embed="rId2"/>
-          <a:stretch>
-            <a:fillRect/>
-          </a:stretch>
-        </p:blipFill>
-        <p:spPr>
+        </p:nvGrpSpPr>
+        <p:grpSpPr>
           <a:xfrm>
-            <a:off x="9955660" y="109641"/>
-            <a:ext cx="1905000" cy="2362200"/>
+            <a:off x="4600574" y="5176837"/>
+            <a:ext cx="1802061" cy="1681163"/>
+            <a:chOff x="9990721" y="1042535"/>
+            <a:chExt cx="1802061" cy="1681163"/>
           </a:xfrm>
-          <a:prstGeom prst="rect">
-            <a:avLst/>
-          </a:prstGeom>
-        </p:spPr>
-      </p:pic>
-      <p:sp>
-        <p:nvSpPr>
-          <p:cNvPr id="6" name="TextBox 5">
-            <a:extLst>
-              <a:ext uri="{FF2B5EF4-FFF2-40B4-BE49-F238E27FC236}">
-                <a16:creationId xmlns:a16="http://schemas.microsoft.com/office/drawing/2014/main" id="{2F8BC47A-C6BC-EA8B-BF2F-962E34EF39D2}"/>
-              </a:ext>
-            </a:extLst>
-          </p:cNvPr>
-          <p:cNvSpPr txBox="1"/>
-          <p:nvPr/>
-        </p:nvSpPr>
-        <p:spPr>
-          <a:xfrm>
-            <a:off x="10274196" y="2612600"/>
-            <a:ext cx="1802061" cy="646331"/>
-          </a:xfrm>
-          <a:prstGeom prst="rect">
-            <a:avLst/>
-          </a:prstGeom>
-          <a:noFill/>
-        </p:spPr>
-        <p:txBody>
-          <a:bodyPr wrap="square" rtlCol="0">
-            <a:spAutoFit/>
-          </a:bodyPr>
-          <a:lstStyle/>
-          <a:p>
-            <a:r>
-              <a:rPr lang="en-US" dirty="0"/>
-              <a:t>Scan QR Code to see flowchart</a:t>
-            </a:r>
-          </a:p>
-        </p:txBody>
-      </p:sp>
-      <p:sp>
-        <p:nvSpPr>
-          <p:cNvPr id="9" name="TextBox 8">
-            <a:extLst>
-              <a:ext uri="{FF2B5EF4-FFF2-40B4-BE49-F238E27FC236}">
-                <a16:creationId xmlns:a16="http://schemas.microsoft.com/office/drawing/2014/main" id="{3024FF3E-F445-36F0-237B-B3BCEC2302BC}"/>
-              </a:ext>
-            </a:extLst>
-          </p:cNvPr>
-          <p:cNvSpPr txBox="1"/>
-          <p:nvPr/>
-        </p:nvSpPr>
-        <p:spPr>
-          <a:xfrm>
-            <a:off x="3888782" y="5867846"/>
-            <a:ext cx="2867983" cy="923330"/>
-          </a:xfrm>
-          <a:prstGeom prst="rect">
-            <a:avLst/>
-          </a:prstGeom>
-          <a:noFill/>
-        </p:spPr>
-        <p:txBody>
-          <a:bodyPr wrap="square" rtlCol="0">
-            <a:spAutoFit/>
-          </a:bodyPr>
-          <a:lstStyle/>
-          <a:p>
-            <a:r>
-              <a:rPr lang="en-US" dirty="0"/>
-              <a:t>Contact Prof. Zimmerman for more information:</a:t>
-            </a:r>
-          </a:p>
-          <a:p>
-            <a:r>
-              <a:rPr lang="en-US" dirty="0">
-                <a:hlinkClick r:id="rId3"/>
-              </a:rPr>
-              <a:t>zimmermant@uwstout.edu</a:t>
-            </a:r>
-            <a:endParaRPr lang="en-US" dirty="0"/>
-          </a:p>
-        </p:txBody>
-      </p:sp>
-      <p:sp>
-        <p:nvSpPr>
-          <p:cNvPr id="14" name="TextBox 13">
-            <a:extLst>
-              <a:ext uri="{FF2B5EF4-FFF2-40B4-BE49-F238E27FC236}">
-                <a16:creationId xmlns:a16="http://schemas.microsoft.com/office/drawing/2014/main" id="{7A14065F-1DA8-E61D-A983-25FEA54F5C7F}"/>
-              </a:ext>
-            </a:extLst>
-          </p:cNvPr>
-          <p:cNvSpPr txBox="1"/>
-          <p:nvPr/>
-        </p:nvSpPr>
-        <p:spPr>
-          <a:xfrm>
-            <a:off x="0" y="4124547"/>
-            <a:ext cx="3773039" cy="2246769"/>
-          </a:xfrm>
-          <a:prstGeom prst="rect">
-            <a:avLst/>
-          </a:prstGeom>
-          <a:noFill/>
-        </p:spPr>
-        <p:txBody>
-          <a:bodyPr wrap="square" rtlCol="0">
-            <a:spAutoFit/>
-          </a:bodyPr>
-          <a:lstStyle/>
-          <a:p>
-            <a:r>
-              <a:rPr lang="en-US" sz="1400" b="1" dirty="0"/>
-              <a:t>Additional Courses:</a:t>
-            </a:r>
-          </a:p>
-          <a:p>
-            <a:r>
-              <a:rPr lang="en-US" sz="1400" dirty="0"/>
-              <a:t>Intro to Physics Research</a:t>
-            </a:r>
-          </a:p>
-          <a:p>
-            <a:r>
-              <a:rPr lang="en-US" sz="1400" dirty="0"/>
-              <a:t>Intro to Quantum Mechanics</a:t>
-            </a:r>
-          </a:p>
-          <a:p>
-            <a:r>
-              <a:rPr lang="en-US" sz="1400" dirty="0"/>
-              <a:t>Computational Classical Physics</a:t>
-            </a:r>
-          </a:p>
-          <a:p>
-            <a:r>
-              <a:rPr lang="en-US" sz="1400" dirty="0"/>
-              <a:t>Solid State Physics</a:t>
-            </a:r>
-          </a:p>
-          <a:p>
-            <a:r>
-              <a:rPr lang="en-US" sz="1400" dirty="0"/>
-              <a:t>Applied Optics and Photonics</a:t>
-            </a:r>
-          </a:p>
-          <a:p>
-            <a:r>
-              <a:rPr lang="en-US" sz="1400" dirty="0"/>
-              <a:t>Advanced Physics Lab</a:t>
-            </a:r>
-          </a:p>
-          <a:p>
-            <a:r>
-              <a:rPr lang="en-US" sz="1400" dirty="0"/>
-              <a:t>Quantum Mechanics</a:t>
-            </a:r>
-          </a:p>
-          <a:p>
-            <a:r>
-              <a:rPr lang="en-US" sz="1400" dirty="0"/>
-              <a:t>Applied Electromagnetics</a:t>
-            </a:r>
-          </a:p>
-          <a:p>
-            <a:r>
-              <a:rPr lang="en-US" sz="1400" dirty="0"/>
-              <a:t>Computer Science I and II</a:t>
-            </a:r>
-            <a:endParaRPr lang="en-US" dirty="0"/>
-          </a:p>
-        </p:txBody>
-      </p:sp>
-      <p:sp>
-        <p:nvSpPr>
-          <p:cNvPr id="15" name="TextBox 14">
-            <a:extLst>
-              <a:ext uri="{FF2B5EF4-FFF2-40B4-BE49-F238E27FC236}">
-                <a16:creationId xmlns:a16="http://schemas.microsoft.com/office/drawing/2014/main" id="{FAE55E7D-A6C0-D3B2-FA60-DBA3F369EFA7}"/>
-              </a:ext>
-            </a:extLst>
-          </p:cNvPr>
-          <p:cNvSpPr txBox="1"/>
-          <p:nvPr/>
-        </p:nvSpPr>
-        <p:spPr>
-          <a:xfrm>
-            <a:off x="49686" y="1806131"/>
-            <a:ext cx="6096000" cy="2308324"/>
-          </a:xfrm>
-          <a:prstGeom prst="rect">
-            <a:avLst/>
-          </a:prstGeom>
-          <a:noFill/>
-        </p:spPr>
-        <p:txBody>
-          <a:bodyPr wrap="square">
-            <a:spAutoFit/>
-          </a:bodyPr>
-          <a:lstStyle/>
-          <a:p>
-            <a:r>
-              <a:rPr lang="en-US" sz="1800" b="1" u="sng" dirty="0"/>
-              <a:t>Engineering 3-2 Programs</a:t>
-            </a:r>
-            <a:br>
-              <a:rPr lang="en-US" sz="1800" dirty="0"/>
-            </a:br>
-            <a:r>
-              <a:rPr lang="en-US" sz="1800" dirty="0"/>
-              <a:t>Many schools have 3-2 program where you study physics for 3 years at a school, then switch </a:t>
-            </a:r>
-            <a:r>
-              <a:rPr lang="en-US" sz="1800"/>
-              <a:t>to another </a:t>
-            </a:r>
-            <a:r>
-              <a:rPr lang="en-US" sz="1800" dirty="0"/>
-              <a:t>school for 2 years studying engineering</a:t>
-            </a:r>
-            <a:r>
-              <a:rPr lang="en-US" dirty="0"/>
-              <a:t> and come out with a </a:t>
-            </a:r>
-            <a:r>
-              <a:rPr lang="en-US" sz="1800" dirty="0"/>
-              <a:t>Dual Degree in Physics and Engineering</a:t>
-            </a:r>
-          </a:p>
-          <a:p>
-            <a:r>
-              <a:rPr lang="en-US" dirty="0">
-                <a:solidFill>
-                  <a:srgbClr val="FF0000"/>
-                </a:solidFill>
-              </a:rPr>
-              <a:t>At Stout you can do the same thing in five years without having to change schools</a:t>
-            </a:r>
-          </a:p>
-          <a:p>
-            <a:endParaRPr lang="en-US" dirty="0"/>
-          </a:p>
-        </p:txBody>
-      </p:sp>
-      <p:sp>
-        <p:nvSpPr>
-          <p:cNvPr id="16" name="Title 1">
-            <a:extLst>
-              <a:ext uri="{FF2B5EF4-FFF2-40B4-BE49-F238E27FC236}">
-                <a16:creationId xmlns:a16="http://schemas.microsoft.com/office/drawing/2014/main" id="{BCB8DD6A-0BEE-46A6-467F-6DCC219FAB40}"/>
-              </a:ext>
-            </a:extLst>
-          </p:cNvPr>
-          <p:cNvSpPr txBox="1">
-            <a:spLocks/>
-          </p:cNvSpPr>
-          <p:nvPr/>
-        </p:nvSpPr>
-        <p:spPr>
-          <a:xfrm>
-            <a:off x="6955434" y="2880963"/>
-            <a:ext cx="4832802" cy="1243584"/>
-          </a:xfrm>
-          <a:prstGeom prst="rect">
-            <a:avLst/>
-          </a:prstGeom>
-        </p:spPr>
-        <p:txBody>
-          <a:bodyPr vert="horz" lIns="91440" tIns="45720" rIns="91440" bIns="45720" rtlCol="0" anchor="ctr">
-            <a:normAutofit/>
-          </a:bodyPr>
-          <a:lstStyle>
-            <a:lvl1pPr algn="l" defTabSz="914400" rtl="0" eaLnBrk="1" latinLnBrk="0" hangingPunct="1">
-              <a:lnSpc>
-                <a:spcPct val="90000"/>
-              </a:lnSpc>
-              <a:spcBef>
-                <a:spcPct val="0"/>
-              </a:spcBef>
-              <a:buNone/>
-              <a:defRPr sz="4400" kern="1200">
-                <a:solidFill>
-                  <a:schemeClr val="tx1"/>
-                </a:solidFill>
-                <a:latin typeface="+mj-lt"/>
-                <a:ea typeface="+mj-ea"/>
-                <a:cs typeface="+mj-cs"/>
-              </a:defRPr>
-            </a:lvl1pPr>
-          </a:lstStyle>
-          <a:p>
-            <a:r>
-              <a:rPr lang="en-US" sz="3400" dirty="0"/>
-              <a:t>Physics Minor</a:t>
-            </a:r>
-          </a:p>
-        </p:txBody>
-      </p:sp>
-      <p:sp>
-        <p:nvSpPr>
-          <p:cNvPr id="17" name="Content Placeholder 2">
-            <a:extLst>
-              <a:ext uri="{FF2B5EF4-FFF2-40B4-BE49-F238E27FC236}">
-                <a16:creationId xmlns:a16="http://schemas.microsoft.com/office/drawing/2014/main" id="{B329C53D-1B5F-3C82-0542-3B0600386B25}"/>
-              </a:ext>
-            </a:extLst>
-          </p:cNvPr>
-          <p:cNvSpPr txBox="1">
-            <a:spLocks/>
-          </p:cNvSpPr>
-          <p:nvPr/>
-        </p:nvSpPr>
-        <p:spPr>
-          <a:xfrm>
-            <a:off x="6879178" y="3709096"/>
-            <a:ext cx="5312822" cy="3335272"/>
-          </a:xfrm>
-          <a:prstGeom prst="rect">
-            <a:avLst/>
-          </a:prstGeom>
-        </p:spPr>
-        <p:txBody>
-          <a:bodyPr vert="horz" lIns="91440" tIns="45720" rIns="91440" bIns="45720" rtlCol="0">
-            <a:normAutofit/>
-          </a:bodyPr>
-          <a:lstStyle>
-            <a:lvl1pPr marL="228600" indent="-228600" algn="l" defTabSz="914400" rtl="0" eaLnBrk="1" latinLnBrk="0" hangingPunct="1">
-              <a:lnSpc>
-                <a:spcPct val="90000"/>
-              </a:lnSpc>
-              <a:spcBef>
-                <a:spcPts val="1000"/>
-              </a:spcBef>
-              <a:buFont typeface="Arial"/>
-              <a:buChar char="•"/>
-              <a:defRPr sz="2800" kern="1200">
-                <a:solidFill>
-                  <a:schemeClr val="tx1"/>
-                </a:solidFill>
-                <a:latin typeface="+mn-lt"/>
-                <a:ea typeface="+mn-ea"/>
-                <a:cs typeface="+mn-cs"/>
-              </a:defRPr>
-            </a:lvl1pPr>
-            <a:lvl2pPr marL="685800" indent="-228600" algn="l" defTabSz="914400" rtl="0" eaLnBrk="1" latinLnBrk="0" hangingPunct="1">
-              <a:lnSpc>
-                <a:spcPct val="90000"/>
-              </a:lnSpc>
-              <a:spcBef>
-                <a:spcPts val="500"/>
-              </a:spcBef>
-              <a:buFont typeface="Arial"/>
-              <a:buChar char="•"/>
-              <a:defRPr sz="2400" kern="1200">
-                <a:solidFill>
-                  <a:schemeClr val="tx1"/>
-                </a:solidFill>
-                <a:latin typeface="+mn-lt"/>
-                <a:ea typeface="+mn-ea"/>
-                <a:cs typeface="+mn-cs"/>
-              </a:defRPr>
-            </a:lvl2pPr>
-            <a:lvl3pPr marL="1143000" indent="-228600" algn="l" defTabSz="914400" rtl="0" eaLnBrk="1" latinLnBrk="0" hangingPunct="1">
-              <a:lnSpc>
-                <a:spcPct val="90000"/>
-              </a:lnSpc>
-              <a:spcBef>
-                <a:spcPts val="500"/>
-              </a:spcBef>
-              <a:buFont typeface="Arial"/>
-              <a:buChar char="•"/>
-              <a:defRPr sz="2000" kern="1200">
-                <a:solidFill>
-                  <a:schemeClr val="tx1"/>
-                </a:solidFill>
-                <a:latin typeface="+mn-lt"/>
-                <a:ea typeface="+mn-ea"/>
-                <a:cs typeface="+mn-cs"/>
-              </a:defRPr>
-            </a:lvl3pPr>
-            <a:lvl4pPr marL="1600200" indent="-228600" algn="l" defTabSz="914400" rtl="0" eaLnBrk="1" latinLnBrk="0" hangingPunct="1">
-              <a:lnSpc>
-                <a:spcPct val="90000"/>
-              </a:lnSpc>
-              <a:spcBef>
-                <a:spcPts val="500"/>
-              </a:spcBef>
-              <a:buFont typeface="Arial"/>
-              <a:buChar char="•"/>
-              <a:defRPr sz="1800" kern="1200">
-                <a:solidFill>
-                  <a:schemeClr val="tx1"/>
-                </a:solidFill>
-                <a:latin typeface="+mn-lt"/>
-                <a:ea typeface="+mn-ea"/>
-                <a:cs typeface="+mn-cs"/>
-              </a:defRPr>
-            </a:lvl4pPr>
-            <a:lvl5pPr marL="2057400" indent="-228600" algn="l" defTabSz="914400" rtl="0" eaLnBrk="1" latinLnBrk="0" hangingPunct="1">
-              <a:lnSpc>
-                <a:spcPct val="90000"/>
-              </a:lnSpc>
-              <a:spcBef>
-                <a:spcPts val="500"/>
-              </a:spcBef>
-              <a:buFont typeface="Arial"/>
-              <a:buChar char="•"/>
-              <a:defRPr sz="1800" kern="1200">
-                <a:solidFill>
-                  <a:schemeClr val="tx1"/>
-                </a:solidFill>
-                <a:latin typeface="+mn-lt"/>
-                <a:ea typeface="+mn-ea"/>
-                <a:cs typeface="+mn-cs"/>
-              </a:defRPr>
-            </a:lvl5pPr>
-            <a:lvl6pPr marL="2514600" indent="-228600" algn="l" defTabSz="914400" rtl="0" eaLnBrk="1" latinLnBrk="0" hangingPunct="1">
-              <a:lnSpc>
-                <a:spcPct val="90000"/>
-              </a:lnSpc>
-              <a:spcBef>
-                <a:spcPts val="500"/>
-              </a:spcBef>
-              <a:buFont typeface="Arial"/>
-              <a:buChar char="•"/>
-              <a:defRPr sz="1800" kern="1200">
-                <a:solidFill>
-                  <a:schemeClr val="tx1"/>
-                </a:solidFill>
-                <a:latin typeface="+mn-lt"/>
-                <a:ea typeface="+mn-ea"/>
-                <a:cs typeface="+mn-cs"/>
-              </a:defRPr>
-            </a:lvl6pPr>
-            <a:lvl7pPr marL="2971800" indent="-228600" algn="l" defTabSz="914400" rtl="0" eaLnBrk="1" latinLnBrk="0" hangingPunct="1">
-              <a:lnSpc>
-                <a:spcPct val="90000"/>
-              </a:lnSpc>
-              <a:spcBef>
-                <a:spcPts val="500"/>
-              </a:spcBef>
-              <a:buFont typeface="Arial"/>
-              <a:buChar char="•"/>
-              <a:defRPr sz="1800" kern="1200">
-                <a:solidFill>
-                  <a:schemeClr val="tx1"/>
-                </a:solidFill>
-                <a:latin typeface="+mn-lt"/>
-                <a:ea typeface="+mn-ea"/>
-                <a:cs typeface="+mn-cs"/>
-              </a:defRPr>
-            </a:lvl7pPr>
-            <a:lvl8pPr marL="3429000" indent="-228600" algn="l" defTabSz="914400" rtl="0" eaLnBrk="1" latinLnBrk="0" hangingPunct="1">
-              <a:lnSpc>
-                <a:spcPct val="90000"/>
-              </a:lnSpc>
-              <a:spcBef>
-                <a:spcPts val="500"/>
-              </a:spcBef>
-              <a:buFont typeface="Arial"/>
-              <a:buChar char="•"/>
-              <a:defRPr sz="1800" kern="1200">
-                <a:solidFill>
-                  <a:schemeClr val="tx1"/>
-                </a:solidFill>
-                <a:latin typeface="+mn-lt"/>
-                <a:ea typeface="+mn-ea"/>
-                <a:cs typeface="+mn-cs"/>
-              </a:defRPr>
-            </a:lvl8pPr>
-            <a:lvl9pPr marL="3886200" indent="-228600" algn="l" defTabSz="914400" rtl="0" eaLnBrk="1" latinLnBrk="0" hangingPunct="1">
-              <a:lnSpc>
-                <a:spcPct val="90000"/>
-              </a:lnSpc>
-              <a:spcBef>
-                <a:spcPts val="500"/>
-              </a:spcBef>
-              <a:buFont typeface="Arial"/>
-              <a:buChar char="•"/>
-              <a:defRPr sz="1800" kern="1200">
-                <a:solidFill>
-                  <a:schemeClr val="tx1"/>
-                </a:solidFill>
-                <a:latin typeface="+mn-lt"/>
-                <a:ea typeface="+mn-ea"/>
-                <a:cs typeface="+mn-cs"/>
-              </a:defRPr>
-            </a:lvl9pPr>
-          </a:lstStyle>
-          <a:p>
-            <a:pPr>
-              <a:buFont typeface="Arial" panose="020B0604020202020204" pitchFamily="34" charset="0"/>
-              <a:buChar char="•"/>
-            </a:pPr>
-            <a:r>
-              <a:rPr lang="en-US" sz="1600" b="1" dirty="0"/>
-              <a:t>Statics</a:t>
-            </a:r>
-            <a:r>
-              <a:rPr lang="en-US" sz="1600" dirty="0"/>
-              <a:t> and </a:t>
-            </a:r>
-            <a:r>
-              <a:rPr lang="en-US" sz="1600" b="1" dirty="0"/>
-              <a:t>Dynamics</a:t>
-            </a:r>
-            <a:r>
-              <a:rPr lang="en-US" sz="1600" dirty="0"/>
-              <a:t> </a:t>
-            </a:r>
-            <a:r>
-              <a:rPr lang="en-US" sz="1600" u="sng" dirty="0"/>
-              <a:t>or</a:t>
-            </a:r>
-            <a:r>
-              <a:rPr lang="en-US" sz="1600" dirty="0"/>
-              <a:t> University Physics I</a:t>
-            </a:r>
-          </a:p>
-          <a:p>
-            <a:pPr>
-              <a:buFont typeface="Arial" panose="020B0604020202020204" pitchFamily="34" charset="0"/>
-              <a:buChar char="•"/>
-            </a:pPr>
-            <a:r>
-              <a:rPr lang="en-US" sz="1600" b="1" dirty="0"/>
-              <a:t>University Physics II</a:t>
-            </a:r>
-          </a:p>
-          <a:p>
-            <a:pPr>
-              <a:buFont typeface="Arial" panose="020B0604020202020204" pitchFamily="34" charset="0"/>
-              <a:buChar char="•"/>
-            </a:pPr>
-            <a:r>
-              <a:rPr lang="en-US" sz="1600" dirty="0"/>
-              <a:t>11 credits from the following:</a:t>
-            </a:r>
-          </a:p>
-          <a:p>
-            <a:pPr lvl="1">
-              <a:buFont typeface="Arial" panose="020B0604020202020204" pitchFamily="34" charset="0"/>
-              <a:buChar char="•"/>
-            </a:pPr>
-            <a:r>
-              <a:rPr lang="en-US" sz="1600" dirty="0"/>
-              <a:t>PHYS-139 Intro to Research</a:t>
-            </a:r>
-          </a:p>
-          <a:p>
-            <a:pPr lvl="1">
-              <a:buFont typeface="Arial" panose="020B0604020202020204" pitchFamily="34" charset="0"/>
-              <a:buChar char="•"/>
-            </a:pPr>
-            <a:r>
-              <a:rPr lang="en-US" sz="1600" b="1" dirty="0"/>
-              <a:t>CEE-355</a:t>
-            </a:r>
-            <a:r>
-              <a:rPr lang="en-US" sz="1600" dirty="0"/>
-              <a:t> Applied E&amp;M</a:t>
-            </a:r>
-          </a:p>
-          <a:p>
-            <a:pPr lvl="1">
-              <a:buFont typeface="Arial" panose="020B0604020202020204" pitchFamily="34" charset="0"/>
-              <a:buChar char="•"/>
-            </a:pPr>
-            <a:r>
-              <a:rPr lang="en-US" sz="1600" dirty="0"/>
-              <a:t>Any PHYS-3XX</a:t>
-            </a:r>
-          </a:p>
-          <a:p>
-            <a:pPr lvl="1">
-              <a:buFont typeface="Arial" panose="020B0604020202020204" pitchFamily="34" charset="0"/>
-              <a:buChar char="•"/>
-            </a:pPr>
-            <a:r>
-              <a:rPr lang="en-US" sz="1600" dirty="0"/>
-              <a:t>Thermodynamics (PHYS-222 </a:t>
-            </a:r>
-            <a:r>
-              <a:rPr lang="en-US" sz="1600" u="sng" dirty="0"/>
-              <a:t>or</a:t>
-            </a:r>
-            <a:r>
-              <a:rPr lang="en-US" sz="1600" dirty="0"/>
-              <a:t> </a:t>
-            </a:r>
-            <a:r>
-              <a:rPr lang="en-US" sz="1600" b="1" dirty="0"/>
-              <a:t>ENGR-275</a:t>
-            </a:r>
-            <a:r>
-              <a:rPr lang="en-US" sz="1600" dirty="0"/>
-              <a:t> </a:t>
-            </a:r>
-            <a:r>
-              <a:rPr lang="en-US" sz="1600" u="sng" dirty="0"/>
-              <a:t>or</a:t>
-            </a:r>
-            <a:r>
-              <a:rPr lang="en-US" sz="1600" dirty="0"/>
-              <a:t> ME-390)</a:t>
-            </a:r>
-          </a:p>
-          <a:p>
-            <a:pPr lvl="1">
-              <a:buFont typeface="Arial" panose="020B0604020202020204" pitchFamily="34" charset="0"/>
-              <a:buChar char="•"/>
-            </a:pPr>
-            <a:endParaRPr lang="en-US" sz="1600" dirty="0"/>
-          </a:p>
-          <a:p>
-            <a:pPr marL="457200" lvl="1" indent="0">
-              <a:buNone/>
-            </a:pPr>
-            <a:r>
-              <a:rPr lang="en-US" sz="1200" dirty="0"/>
-              <a:t>Classes in bold are ones you take for your major </a:t>
-            </a:r>
-          </a:p>
-          <a:p>
-            <a:pPr marL="457200" lvl="1" indent="0">
-              <a:buNone/>
-            </a:pPr>
-            <a:r>
-              <a:rPr lang="en-US" sz="1200" dirty="0"/>
-              <a:t>so you only need 5 more credits for the minor</a:t>
-            </a:r>
-            <a:endParaRPr lang="en-US" sz="1600" dirty="0"/>
-          </a:p>
-          <a:p>
-            <a:pPr lvl="1">
-              <a:buFont typeface="Arial" panose="020B0604020202020204" pitchFamily="34" charset="0"/>
-              <a:buChar char="•"/>
-            </a:pPr>
-            <a:endParaRPr lang="en-US" sz="1600" dirty="0"/>
-          </a:p>
-          <a:p>
-            <a:pPr lvl="1">
-              <a:buFont typeface="Arial" panose="020B0604020202020204" pitchFamily="34" charset="0"/>
-              <a:buChar char="•"/>
-            </a:pPr>
-            <a:endParaRPr lang="en-US" sz="1600" dirty="0"/>
-          </a:p>
-        </p:txBody>
-      </p:sp>
+        </p:grpSpPr>
+        <p:pic>
+          <p:nvPicPr>
+            <p:cNvPr id="33" name="Picture 32">
+              <a:extLst>
+                <a:ext uri="{FF2B5EF4-FFF2-40B4-BE49-F238E27FC236}">
+                  <a16:creationId xmlns:a16="http://schemas.microsoft.com/office/drawing/2014/main" id="{D9A1EBFD-76DB-DEF4-F72E-529C9D12A954}"/>
+                </a:ext>
+              </a:extLst>
+            </p:cNvPr>
+            <p:cNvPicPr>
+              <a:picLocks noChangeAspect="1"/>
+            </p:cNvPicPr>
+            <p:nvPr/>
+          </p:nvPicPr>
+          <p:blipFill>
+            <a:blip r:embed="rId3"/>
+            <a:stretch>
+              <a:fillRect/>
+            </a:stretch>
+          </p:blipFill>
+          <p:spPr>
+            <a:xfrm>
+              <a:off x="10315418" y="1042535"/>
+              <a:ext cx="1152666" cy="1429306"/>
+            </a:xfrm>
+            <a:prstGeom prst="rect">
+              <a:avLst/>
+            </a:prstGeom>
+          </p:spPr>
+        </p:pic>
+        <p:sp>
+          <p:nvSpPr>
+            <p:cNvPr id="42" name="TextBox 41">
+              <a:extLst>
+                <a:ext uri="{FF2B5EF4-FFF2-40B4-BE49-F238E27FC236}">
+                  <a16:creationId xmlns:a16="http://schemas.microsoft.com/office/drawing/2014/main" id="{EE5C6403-1421-0EAF-355C-BD96BD86242E}"/>
+                </a:ext>
+              </a:extLst>
+            </p:cNvPr>
+            <p:cNvSpPr txBox="1"/>
+            <p:nvPr/>
+          </p:nvSpPr>
+          <p:spPr>
+            <a:xfrm>
+              <a:off x="9990721" y="2354366"/>
+              <a:ext cx="1802061" cy="369332"/>
+            </a:xfrm>
+            <a:prstGeom prst="rect">
+              <a:avLst/>
+            </a:prstGeom>
+            <a:noFill/>
+          </p:spPr>
+          <p:txBody>
+            <a:bodyPr wrap="square" rtlCol="0">
+              <a:spAutoFit/>
+            </a:bodyPr>
+            <a:lstStyle/>
+            <a:p>
+              <a:pPr algn="ctr"/>
+              <a:r>
+                <a:rPr lang="en-US" dirty="0"/>
+                <a:t>for flowchart</a:t>
+              </a:r>
+            </a:p>
+          </p:txBody>
+        </p:sp>
+      </p:grpSp>
     </p:spTree>
     <p:extLst>
       <p:ext uri="{BB962C8B-B14F-4D97-AF65-F5344CB8AC3E}">
@@ -4162,7 +3834,7 @@
     </p:extLst>
   </p:cSld>
   <p:clrMapOvr>
-    <a:masterClrMapping/>
+    <a:overrideClrMapping bg1="dk1" tx1="lt1" bg2="dk2" tx2="lt2" accent1="accent1" accent2="accent2" accent3="accent3" accent4="accent4" accent5="accent5" accent6="accent6" hlink="hlink" folHlink="folHlink"/>
   </p:clrMapOvr>
 </p:sld>
 </file>
@@ -4170,6 +3842,14 @@
 <file path=ppt/slides/slide2.xml><?xml version="1.0" encoding="utf-8"?>
 <p:sld xmlns:a="http://schemas.openxmlformats.org/drawingml/2006/main" xmlns:r="http://schemas.openxmlformats.org/officeDocument/2006/relationships" xmlns:p="http://schemas.openxmlformats.org/presentationml/2006/main">
   <p:cSld>
+    <p:bg>
+      <p:bgPr>
+        <a:solidFill>
+          <a:schemeClr val="bg1"/>
+        </a:solidFill>
+        <a:effectLst/>
+      </p:bgPr>
+    </p:bg>
     <p:spTree>
       <p:nvGrpSpPr>
         <p:cNvPr id="1" name=""/>
@@ -4184,6 +3864,66 @@
           <a:chExt cx="0" cy="0"/>
         </a:xfrm>
       </p:grpSpPr>
+      <p:sp useBgFill="1">
+        <p:nvSpPr>
+          <p:cNvPr id="39" name="Rectangle 38">
+            <a:extLst>
+              <a:ext uri="{FF2B5EF4-FFF2-40B4-BE49-F238E27FC236}">
+                <a16:creationId xmlns:a16="http://schemas.microsoft.com/office/drawing/2014/main" id="{7C98A213-5994-475E-B327-DC6EC27FBA8B}"/>
+              </a:ext>
+              <a:ext uri="{C183D7F6-B498-43B3-948B-1728B52AA6E4}">
+                <adec:decorative xmlns:adec="http://schemas.microsoft.com/office/drawing/2017/decorative" val="1"/>
+              </a:ext>
+            </a:extLst>
+          </p:cNvPr>
+          <p:cNvSpPr>
+            <a:spLocks noGrp="1" noRot="1" noChangeAspect="1" noMove="1" noResize="1" noEditPoints="1" noAdjustHandles="1" noChangeArrowheads="1" noChangeShapeType="1" noTextEdit="1"/>
+          </p:cNvSpPr>
+          <p:nvPr>
+            <p:extLst>
+              <p:ext uri="{386F3935-93C4-4BCD-93E2-E3B085C9AB24}">
+                <p16:designElem xmlns:p16="http://schemas.microsoft.com/office/powerpoint/2015/main" val="1"/>
+              </p:ext>
+            </p:extLst>
+          </p:nvPr>
+        </p:nvSpPr>
+        <p:spPr>
+          <a:xfrm>
+            <a:off x="0" y="0"/>
+            <a:ext cx="12188952" cy="6858000"/>
+          </a:xfrm>
+          <a:prstGeom prst="rect">
+            <a:avLst/>
+          </a:prstGeom>
+          <a:ln>
+            <a:noFill/>
+          </a:ln>
+        </p:spPr>
+        <p:style>
+          <a:lnRef idx="2">
+            <a:schemeClr val="accent1">
+              <a:shade val="50000"/>
+            </a:schemeClr>
+          </a:lnRef>
+          <a:fillRef idx="1">
+            <a:schemeClr val="accent1"/>
+          </a:fillRef>
+          <a:effectRef idx="0">
+            <a:schemeClr val="accent1"/>
+          </a:effectRef>
+          <a:fontRef idx="minor">
+            <a:schemeClr val="lt1"/>
+          </a:fontRef>
+        </p:style>
+        <p:txBody>
+          <a:bodyPr rtlCol="0" anchor="ctr"/>
+          <a:lstStyle/>
+          <a:p>
+            <a:pPr algn="ctr"/>
+            <a:endParaRPr lang="en-US"/>
+          </a:p>
+        </p:txBody>
+      </p:sp>
       <p:sp>
         <p:nvSpPr>
           <p:cNvPr id="2" name="Title 1">
@@ -4200,249 +3940,1220 @@
             <p:ph type="title"/>
           </p:nvPr>
         </p:nvSpPr>
-        <p:spPr/>
-        <p:txBody>
-          <a:bodyPr/>
+        <p:spPr>
+          <a:xfrm>
+            <a:off x="638881" y="670218"/>
+            <a:ext cx="10909640" cy="1065836"/>
+          </a:xfrm>
+        </p:spPr>
+        <p:txBody>
+          <a:bodyPr vert="horz" lIns="91440" tIns="45720" rIns="91440" bIns="45720" rtlCol="0" anchor="ctr">
+            <a:normAutofit/>
+          </a:bodyPr>
           <a:lstStyle/>
           <a:p>
-            <a:r>
-              <a:rPr lang="en-US" dirty="0"/>
-              <a:t>Fall Classes</a:t>
-            </a:r>
-          </a:p>
-        </p:txBody>
-      </p:sp>
-      <p:pic>
-        <p:nvPicPr>
-          <p:cNvPr id="4" name="Picture 3" descr="/Users/toddzimmerman/Downloads/optics-header.jpg">
+            <a:pPr algn="ctr"/>
+            <a:r>
+              <a:rPr lang="en-US" sz="6600" dirty="0"/>
+              <a:t>Fall 2025 Classes</a:t>
+            </a:r>
+          </a:p>
+        </p:txBody>
+      </p:sp>
+      <p:sp>
+        <p:nvSpPr>
+          <p:cNvPr id="41" name="sketch line">
             <a:extLst>
               <a:ext uri="{FF2B5EF4-FFF2-40B4-BE49-F238E27FC236}">
-                <a16:creationId xmlns:a16="http://schemas.microsoft.com/office/drawing/2014/main" id="{25078012-7119-DC96-EC13-8FE60EA07B4A}"/>
+                <a16:creationId xmlns:a16="http://schemas.microsoft.com/office/drawing/2014/main" id="{4B030A0D-0DAD-4A99-89BB-419527D6A64B}"/>
+              </a:ext>
+              <a:ext uri="{C183D7F6-B498-43B3-948B-1728B52AA6E4}">
+                <adec:decorative xmlns:adec="http://schemas.microsoft.com/office/drawing/2017/decorative" val="1"/>
               </a:ext>
             </a:extLst>
           </p:cNvPr>
-          <p:cNvPicPr/>
-          <p:nvPr/>
-        </p:nvPicPr>
-        <p:blipFill>
-          <a:blip r:embed="rId2" cstate="print">
+          <p:cNvSpPr>
+            <a:spLocks noGrp="1" noRot="1" noChangeAspect="1" noMove="1" noResize="1" noEditPoints="1" noAdjustHandles="1" noChangeArrowheads="1" noChangeShapeType="1" noTextEdit="1"/>
+          </p:cNvSpPr>
+          <p:nvPr>
+            <p:extLst>
+              <p:ext uri="{386F3935-93C4-4BCD-93E2-E3B085C9AB24}">
+                <p16:designElem xmlns:p16="http://schemas.microsoft.com/office/powerpoint/2015/main" val="1"/>
+              </p:ext>
+            </p:extLst>
+          </p:nvPr>
+        </p:nvSpPr>
+        <p:spPr>
+          <a:xfrm>
+            <a:off x="3389376" y="1800088"/>
+            <a:ext cx="5410200" cy="18288"/>
+          </a:xfrm>
+          <a:custGeom>
+            <a:avLst/>
+            <a:gdLst>
+              <a:gd name="connsiteX0" fmla="*/ 0 w 5410200"/>
+              <a:gd name="connsiteY0" fmla="*/ 0 h 18288"/>
+              <a:gd name="connsiteX1" fmla="*/ 568071 w 5410200"/>
+              <a:gd name="connsiteY1" fmla="*/ 0 h 18288"/>
+              <a:gd name="connsiteX2" fmla="*/ 1298448 w 5410200"/>
+              <a:gd name="connsiteY2" fmla="*/ 0 h 18288"/>
+              <a:gd name="connsiteX3" fmla="*/ 1920621 w 5410200"/>
+              <a:gd name="connsiteY3" fmla="*/ 0 h 18288"/>
+              <a:gd name="connsiteX4" fmla="*/ 2488692 w 5410200"/>
+              <a:gd name="connsiteY4" fmla="*/ 0 h 18288"/>
+              <a:gd name="connsiteX5" fmla="*/ 3219069 w 5410200"/>
+              <a:gd name="connsiteY5" fmla="*/ 0 h 18288"/>
+              <a:gd name="connsiteX6" fmla="*/ 3895344 w 5410200"/>
+              <a:gd name="connsiteY6" fmla="*/ 0 h 18288"/>
+              <a:gd name="connsiteX7" fmla="*/ 4571619 w 5410200"/>
+              <a:gd name="connsiteY7" fmla="*/ 0 h 18288"/>
+              <a:gd name="connsiteX8" fmla="*/ 5410200 w 5410200"/>
+              <a:gd name="connsiteY8" fmla="*/ 0 h 18288"/>
+              <a:gd name="connsiteX9" fmla="*/ 5410200 w 5410200"/>
+              <a:gd name="connsiteY9" fmla="*/ 18288 h 18288"/>
+              <a:gd name="connsiteX10" fmla="*/ 4842129 w 5410200"/>
+              <a:gd name="connsiteY10" fmla="*/ 18288 h 18288"/>
+              <a:gd name="connsiteX11" fmla="*/ 4328160 w 5410200"/>
+              <a:gd name="connsiteY11" fmla="*/ 18288 h 18288"/>
+              <a:gd name="connsiteX12" fmla="*/ 3597783 w 5410200"/>
+              <a:gd name="connsiteY12" fmla="*/ 18288 h 18288"/>
+              <a:gd name="connsiteX13" fmla="*/ 3029712 w 5410200"/>
+              <a:gd name="connsiteY13" fmla="*/ 18288 h 18288"/>
+              <a:gd name="connsiteX14" fmla="*/ 2299335 w 5410200"/>
+              <a:gd name="connsiteY14" fmla="*/ 18288 h 18288"/>
+              <a:gd name="connsiteX15" fmla="*/ 1514856 w 5410200"/>
+              <a:gd name="connsiteY15" fmla="*/ 18288 h 18288"/>
+              <a:gd name="connsiteX16" fmla="*/ 892683 w 5410200"/>
+              <a:gd name="connsiteY16" fmla="*/ 18288 h 18288"/>
+              <a:gd name="connsiteX17" fmla="*/ 0 w 5410200"/>
+              <a:gd name="connsiteY17" fmla="*/ 18288 h 18288"/>
+              <a:gd name="connsiteX18" fmla="*/ 0 w 5410200"/>
+              <a:gd name="connsiteY18" fmla="*/ 0 h 18288"/>
+            </a:gdLst>
+            <a:ahLst/>
+            <a:cxnLst>
+              <a:cxn ang="0">
+                <a:pos x="connsiteX0" y="connsiteY0"/>
+              </a:cxn>
+              <a:cxn ang="0">
+                <a:pos x="connsiteX1" y="connsiteY1"/>
+              </a:cxn>
+              <a:cxn ang="0">
+                <a:pos x="connsiteX2" y="connsiteY2"/>
+              </a:cxn>
+              <a:cxn ang="0">
+                <a:pos x="connsiteX3" y="connsiteY3"/>
+              </a:cxn>
+              <a:cxn ang="0">
+                <a:pos x="connsiteX4" y="connsiteY4"/>
+              </a:cxn>
+              <a:cxn ang="0">
+                <a:pos x="connsiteX5" y="connsiteY5"/>
+              </a:cxn>
+              <a:cxn ang="0">
+                <a:pos x="connsiteX6" y="connsiteY6"/>
+              </a:cxn>
+              <a:cxn ang="0">
+                <a:pos x="connsiteX7" y="connsiteY7"/>
+              </a:cxn>
+              <a:cxn ang="0">
+                <a:pos x="connsiteX8" y="connsiteY8"/>
+              </a:cxn>
+              <a:cxn ang="0">
+                <a:pos x="connsiteX9" y="connsiteY9"/>
+              </a:cxn>
+              <a:cxn ang="0">
+                <a:pos x="connsiteX10" y="connsiteY10"/>
+              </a:cxn>
+              <a:cxn ang="0">
+                <a:pos x="connsiteX11" y="connsiteY11"/>
+              </a:cxn>
+              <a:cxn ang="0">
+                <a:pos x="connsiteX12" y="connsiteY12"/>
+              </a:cxn>
+              <a:cxn ang="0">
+                <a:pos x="connsiteX13" y="connsiteY13"/>
+              </a:cxn>
+              <a:cxn ang="0">
+                <a:pos x="connsiteX14" y="connsiteY14"/>
+              </a:cxn>
+              <a:cxn ang="0">
+                <a:pos x="connsiteX15" y="connsiteY15"/>
+              </a:cxn>
+              <a:cxn ang="0">
+                <a:pos x="connsiteX16" y="connsiteY16"/>
+              </a:cxn>
+              <a:cxn ang="0">
+                <a:pos x="connsiteX17" y="connsiteY17"/>
+              </a:cxn>
+              <a:cxn ang="0">
+                <a:pos x="connsiteX18" y="connsiteY18"/>
+              </a:cxn>
+            </a:cxnLst>
+            <a:rect l="l" t="t" r="r" b="b"/>
+            <a:pathLst>
+              <a:path w="5410200" h="18288" fill="none" extrusionOk="0">
+                <a:moveTo>
+                  <a:pt x="0" y="0"/>
+                </a:moveTo>
+                <a:cubicBezTo>
+                  <a:pt x="163050" y="-18707"/>
+                  <a:pt x="319321" y="-16364"/>
+                  <a:pt x="568071" y="0"/>
+                </a:cubicBezTo>
+                <a:cubicBezTo>
+                  <a:pt x="816821" y="16364"/>
+                  <a:pt x="1013224" y="-7268"/>
+                  <a:pt x="1298448" y="0"/>
+                </a:cubicBezTo>
+                <a:cubicBezTo>
+                  <a:pt x="1583672" y="7268"/>
+                  <a:pt x="1631711" y="-3367"/>
+                  <a:pt x="1920621" y="0"/>
+                </a:cubicBezTo>
+                <a:cubicBezTo>
+                  <a:pt x="2209531" y="3367"/>
+                  <a:pt x="2364420" y="-19184"/>
+                  <a:pt x="2488692" y="0"/>
+                </a:cubicBezTo>
+                <a:cubicBezTo>
+                  <a:pt x="2612964" y="19184"/>
+                  <a:pt x="3023298" y="-34627"/>
+                  <a:pt x="3219069" y="0"/>
+                </a:cubicBezTo>
+                <a:cubicBezTo>
+                  <a:pt x="3414840" y="34627"/>
+                  <a:pt x="3656810" y="24043"/>
+                  <a:pt x="3895344" y="0"/>
+                </a:cubicBezTo>
+                <a:cubicBezTo>
+                  <a:pt x="4133879" y="-24043"/>
+                  <a:pt x="4393984" y="-19577"/>
+                  <a:pt x="4571619" y="0"/>
+                </a:cubicBezTo>
+                <a:cubicBezTo>
+                  <a:pt x="4749255" y="19577"/>
+                  <a:pt x="5179928" y="-6281"/>
+                  <a:pt x="5410200" y="0"/>
+                </a:cubicBezTo>
+                <a:cubicBezTo>
+                  <a:pt x="5410730" y="6954"/>
+                  <a:pt x="5410934" y="12839"/>
+                  <a:pt x="5410200" y="18288"/>
+                </a:cubicBezTo>
+                <a:cubicBezTo>
+                  <a:pt x="5139060" y="6751"/>
+                  <a:pt x="5121593" y="31035"/>
+                  <a:pt x="4842129" y="18288"/>
+                </a:cubicBezTo>
+                <a:cubicBezTo>
+                  <a:pt x="4562665" y="5541"/>
+                  <a:pt x="4448273" y="9487"/>
+                  <a:pt x="4328160" y="18288"/>
+                </a:cubicBezTo>
+                <a:cubicBezTo>
+                  <a:pt x="4208047" y="27089"/>
+                  <a:pt x="3760936" y="22567"/>
+                  <a:pt x="3597783" y="18288"/>
+                </a:cubicBezTo>
+                <a:cubicBezTo>
+                  <a:pt x="3434630" y="14009"/>
+                  <a:pt x="3299718" y="33213"/>
+                  <a:pt x="3029712" y="18288"/>
+                </a:cubicBezTo>
+                <a:cubicBezTo>
+                  <a:pt x="2759706" y="3363"/>
+                  <a:pt x="2640159" y="27394"/>
+                  <a:pt x="2299335" y="18288"/>
+                </a:cubicBezTo>
+                <a:cubicBezTo>
+                  <a:pt x="1958511" y="9182"/>
+                  <a:pt x="1801186" y="28985"/>
+                  <a:pt x="1514856" y="18288"/>
+                </a:cubicBezTo>
+                <a:cubicBezTo>
+                  <a:pt x="1228526" y="7591"/>
+                  <a:pt x="1063509" y="-5305"/>
+                  <a:pt x="892683" y="18288"/>
+                </a:cubicBezTo>
+                <a:cubicBezTo>
+                  <a:pt x="721857" y="41881"/>
+                  <a:pt x="186945" y="-20897"/>
+                  <a:pt x="0" y="18288"/>
+                </a:cubicBezTo>
+                <a:cubicBezTo>
+                  <a:pt x="-570" y="9279"/>
+                  <a:pt x="132" y="5100"/>
+                  <a:pt x="0" y="0"/>
+                </a:cubicBezTo>
+                <a:close/>
+              </a:path>
+              <a:path w="5410200" h="18288" stroke="0" extrusionOk="0">
+                <a:moveTo>
+                  <a:pt x="0" y="0"/>
+                </a:moveTo>
+                <a:cubicBezTo>
+                  <a:pt x="285096" y="-4925"/>
+                  <a:pt x="376456" y="22268"/>
+                  <a:pt x="622173" y="0"/>
+                </a:cubicBezTo>
+                <a:cubicBezTo>
+                  <a:pt x="867890" y="-22268"/>
+                  <a:pt x="1031392" y="7228"/>
+                  <a:pt x="1136142" y="0"/>
+                </a:cubicBezTo>
+                <a:cubicBezTo>
+                  <a:pt x="1240892" y="-7228"/>
+                  <a:pt x="1561853" y="9877"/>
+                  <a:pt x="1920621" y="0"/>
+                </a:cubicBezTo>
+                <a:cubicBezTo>
+                  <a:pt x="2279389" y="-9877"/>
+                  <a:pt x="2367255" y="19546"/>
+                  <a:pt x="2542794" y="0"/>
+                </a:cubicBezTo>
+                <a:cubicBezTo>
+                  <a:pt x="2718333" y="-19546"/>
+                  <a:pt x="2866732" y="-22226"/>
+                  <a:pt x="3164967" y="0"/>
+                </a:cubicBezTo>
+                <a:cubicBezTo>
+                  <a:pt x="3463202" y="22226"/>
+                  <a:pt x="3568055" y="-2765"/>
+                  <a:pt x="3949446" y="0"/>
+                </a:cubicBezTo>
+                <a:cubicBezTo>
+                  <a:pt x="4330837" y="2765"/>
+                  <a:pt x="4287895" y="10557"/>
+                  <a:pt x="4517517" y="0"/>
+                </a:cubicBezTo>
+                <a:cubicBezTo>
+                  <a:pt x="4747139" y="-10557"/>
+                  <a:pt x="5149588" y="8716"/>
+                  <a:pt x="5410200" y="0"/>
+                </a:cubicBezTo>
+                <a:cubicBezTo>
+                  <a:pt x="5409517" y="5414"/>
+                  <a:pt x="5409480" y="12510"/>
+                  <a:pt x="5410200" y="18288"/>
+                </a:cubicBezTo>
+                <a:cubicBezTo>
+                  <a:pt x="5163327" y="41494"/>
+                  <a:pt x="5008749" y="10693"/>
+                  <a:pt x="4842129" y="18288"/>
+                </a:cubicBezTo>
+                <a:cubicBezTo>
+                  <a:pt x="4675509" y="25883"/>
+                  <a:pt x="4433401" y="-615"/>
+                  <a:pt x="4165854" y="18288"/>
+                </a:cubicBezTo>
+                <a:cubicBezTo>
+                  <a:pt x="3898308" y="37191"/>
+                  <a:pt x="3809032" y="-8710"/>
+                  <a:pt x="3543681" y="18288"/>
+                </a:cubicBezTo>
+                <a:cubicBezTo>
+                  <a:pt x="3278330" y="45286"/>
+                  <a:pt x="3073876" y="-15917"/>
+                  <a:pt x="2759202" y="18288"/>
+                </a:cubicBezTo>
+                <a:cubicBezTo>
+                  <a:pt x="2444528" y="52493"/>
+                  <a:pt x="2204144" y="3372"/>
+                  <a:pt x="1974723" y="18288"/>
+                </a:cubicBezTo>
+                <a:cubicBezTo>
+                  <a:pt x="1745302" y="33204"/>
+                  <a:pt x="1602335" y="31490"/>
+                  <a:pt x="1406652" y="18288"/>
+                </a:cubicBezTo>
+                <a:cubicBezTo>
+                  <a:pt x="1210969" y="5086"/>
+                  <a:pt x="923948" y="3161"/>
+                  <a:pt x="730377" y="18288"/>
+                </a:cubicBezTo>
+                <a:cubicBezTo>
+                  <a:pt x="536806" y="33415"/>
+                  <a:pt x="336496" y="-141"/>
+                  <a:pt x="0" y="18288"/>
+                </a:cubicBezTo>
+                <a:cubicBezTo>
+                  <a:pt x="-306" y="11061"/>
+                  <a:pt x="-655" y="7751"/>
+                  <a:pt x="0" y="0"/>
+                </a:cubicBezTo>
+                <a:close/>
+              </a:path>
+            </a:pathLst>
+          </a:custGeom>
+          <a:solidFill>
+            <a:schemeClr val="accent2"/>
+          </a:solidFill>
+          <a:ln w="41275" cap="rnd">
+            <a:solidFill>
+              <a:schemeClr val="accent2"/>
+            </a:solidFill>
+            <a:round/>
             <a:extLst>
-              <a:ext uri="{28A0092B-C50C-407E-A947-70E740481C1C}">
-                <a14:useLocalDpi xmlns:a14="http://schemas.microsoft.com/office/drawing/2010/main" val="0"/>
+              <a:ext uri="{C807C97D-BFC1-408E-A445-0C87EB9F89A2}">
+                <ask:lineSketchStyleProps xmlns:ask="http://schemas.microsoft.com/office/drawing/2018/sketchyshapes" sd="1219033472">
+                  <a:prstGeom prst="rect">
+                    <a:avLst/>
+                  </a:prstGeom>
+                  <ask:type>
+                    <ask:lineSketchFreehand/>
+                  </ask:type>
+                </ask:lineSketchStyleProps>
               </a:ext>
             </a:extLst>
-          </a:blip>
-          <a:srcRect/>
-          <a:stretch>
-            <a:fillRect/>
-          </a:stretch>
-        </p:blipFill>
-        <p:spPr bwMode="auto">
-          <a:xfrm>
-            <a:off x="383407" y="1591106"/>
-            <a:ext cx="4057247" cy="2388857"/>
-          </a:xfrm>
-          <a:prstGeom prst="rect">
-            <a:avLst/>
-          </a:prstGeom>
-          <a:noFill/>
-          <a:ln>
-            <a:noFill/>
           </a:ln>
         </p:spPr>
-      </p:pic>
-      <p:sp>
-        <p:nvSpPr>
-          <p:cNvPr id="5" name="Title 1">
+        <p:style>
+          <a:lnRef idx="2">
+            <a:schemeClr val="accent1">
+              <a:shade val="50000"/>
+            </a:schemeClr>
+          </a:lnRef>
+          <a:fillRef idx="1">
+            <a:schemeClr val="accent1"/>
+          </a:fillRef>
+          <a:effectRef idx="0">
+            <a:schemeClr val="accent1"/>
+          </a:effectRef>
+          <a:fontRef idx="minor">
+            <a:schemeClr val="lt1"/>
+          </a:fontRef>
+        </p:style>
+        <p:txBody>
+          <a:bodyPr rtlCol="0" anchor="ctr"/>
+          <a:lstStyle/>
+          <a:p>
+            <a:pPr algn="ctr"/>
+            <a:endParaRPr lang="en-US"/>
+          </a:p>
+        </p:txBody>
+      </p:sp>
+      <p:grpSp>
+        <p:nvGrpSpPr>
+          <p:cNvPr id="32" name="Group 31">
             <a:extLst>
               <a:ext uri="{FF2B5EF4-FFF2-40B4-BE49-F238E27FC236}">
-                <a16:creationId xmlns:a16="http://schemas.microsoft.com/office/drawing/2014/main" id="{E16B11D3-5800-DA3B-73DB-60FA0A01474B}"/>
+                <a16:creationId xmlns:a16="http://schemas.microsoft.com/office/drawing/2014/main" id="{689D9A0E-C0BA-CA32-18AD-DA2EAF3FE529}"/>
               </a:ext>
             </a:extLst>
           </p:cNvPr>
-          <p:cNvSpPr txBox="1">
-            <a:spLocks/>
-          </p:cNvSpPr>
+          <p:cNvGrpSpPr/>
           <p:nvPr/>
-        </p:nvSpPr>
-        <p:spPr>
+        </p:nvGrpSpPr>
+        <p:grpSpPr>
           <a:xfrm>
-            <a:off x="383406" y="1591106"/>
-            <a:ext cx="4489272" cy="323951"/>
+            <a:off x="686240" y="2619784"/>
+            <a:ext cx="2970920" cy="3600041"/>
+            <a:chOff x="383406" y="1591106"/>
+            <a:chExt cx="4045166" cy="4901769"/>
           </a:xfrm>
-          <a:prstGeom prst="rect">
-            <a:avLst/>
-          </a:prstGeom>
-        </p:spPr>
-        <p:txBody>
-          <a:bodyPr vert="horz" lIns="91440" tIns="45720" rIns="91440" bIns="45720" rtlCol="0" anchor="ctr">
-            <a:normAutofit fontScale="40000" lnSpcReduction="20000"/>
-          </a:bodyPr>
-          <a:lstStyle>
-            <a:lvl1pPr algn="l" defTabSz="914400" rtl="0" eaLnBrk="1" latinLnBrk="0" hangingPunct="1">
-              <a:lnSpc>
-                <a:spcPct val="90000"/>
-              </a:lnSpc>
-              <a:spcBef>
-                <a:spcPct val="0"/>
-              </a:spcBef>
-              <a:buNone/>
-              <a:defRPr sz="4400" kern="1200">
+        </p:grpSpPr>
+        <p:pic>
+          <p:nvPicPr>
+            <p:cNvPr id="4" name="Picture 3" descr="/Users/toddzimmerman/Downloads/optics-header.jpg">
+              <a:extLst>
+                <a:ext uri="{FF2B5EF4-FFF2-40B4-BE49-F238E27FC236}">
+                  <a16:creationId xmlns:a16="http://schemas.microsoft.com/office/drawing/2014/main" id="{25078012-7119-DC96-EC13-8FE60EA07B4A}"/>
+                </a:ext>
+              </a:extLst>
+            </p:cNvPr>
+            <p:cNvPicPr/>
+            <p:nvPr/>
+          </p:nvPicPr>
+          <p:blipFill>
+            <a:blip r:embed="rId2" cstate="print">
+              <a:alphaModFix amt="35000"/>
+              <a:extLst>
+                <a:ext uri="{28A0092B-C50C-407E-A947-70E740481C1C}">
+                  <a14:useLocalDpi xmlns:a14="http://schemas.microsoft.com/office/drawing/2010/main" val="0"/>
+                </a:ext>
+              </a:extLst>
+            </a:blip>
+            <a:srcRect r="51411"/>
+            <a:stretch/>
+          </p:blipFill>
+          <p:spPr bwMode="auto">
+            <a:xfrm>
+              <a:off x="383408" y="1591106"/>
+              <a:ext cx="4045164" cy="4901769"/>
+            </a:xfrm>
+            <a:prstGeom prst="rect">
+              <a:avLst/>
+            </a:prstGeom>
+            <a:noFill/>
+            <a:ln>
+              <a:noFill/>
+            </a:ln>
+          </p:spPr>
+        </p:pic>
+        <p:sp>
+          <p:nvSpPr>
+            <p:cNvPr id="5" name="Title 1">
+              <a:extLst>
+                <a:ext uri="{FF2B5EF4-FFF2-40B4-BE49-F238E27FC236}">
+                  <a16:creationId xmlns:a16="http://schemas.microsoft.com/office/drawing/2014/main" id="{E16B11D3-5800-DA3B-73DB-60FA0A01474B}"/>
+                </a:ext>
+              </a:extLst>
+            </p:cNvPr>
+            <p:cNvSpPr txBox="1">
+              <a:spLocks/>
+            </p:cNvSpPr>
+            <p:nvPr/>
+          </p:nvSpPr>
+          <p:spPr>
+            <a:xfrm>
+              <a:off x="383406" y="1591106"/>
+              <a:ext cx="3777659" cy="4858140"/>
+            </a:xfrm>
+            <a:prstGeom prst="rect">
+              <a:avLst/>
+            </a:prstGeom>
+          </p:spPr>
+          <p:txBody>
+            <a:bodyPr vert="horz" lIns="91440" tIns="45720" rIns="91440" bIns="45720" rtlCol="0" anchor="ctr">
+              <a:normAutofit lnSpcReduction="10000"/>
+            </a:bodyPr>
+            <a:lstStyle>
+              <a:lvl1pPr algn="l" defTabSz="914400" rtl="0" eaLnBrk="1" latinLnBrk="0" hangingPunct="1">
+                <a:lnSpc>
+                  <a:spcPct val="90000"/>
+                </a:lnSpc>
+                <a:spcBef>
+                  <a:spcPct val="0"/>
+                </a:spcBef>
+                <a:buNone/>
+                <a:defRPr sz="4400" kern="1200">
+                  <a:solidFill>
+                    <a:schemeClr val="tx1"/>
+                  </a:solidFill>
+                  <a:latin typeface="+mj-lt"/>
+                  <a:ea typeface="+mj-ea"/>
+                  <a:cs typeface="+mj-cs"/>
+                </a:defRPr>
+              </a:lvl1pPr>
+            </a:lstStyle>
+            <a:p>
+              <a:pPr defTabSz="667512">
+                <a:spcAft>
+                  <a:spcPts val="600"/>
+                </a:spcAft>
+              </a:pPr>
+              <a:r>
+                <a:rPr lang="en-US" sz="2000" kern="1200" dirty="0">
+                  <a:solidFill>
+                    <a:srgbClr val="FF0000"/>
+                  </a:solidFill>
+                  <a:latin typeface="+mj-lt"/>
+                  <a:ea typeface="+mj-ea"/>
+                  <a:cs typeface="+mj-cs"/>
+                </a:rPr>
+                <a:t>PHYS-335 </a:t>
+              </a:r>
+              <a:r>
+                <a:rPr lang="en-US" sz="2000" i="1" kern="1200" dirty="0">
+                  <a:solidFill>
+                    <a:srgbClr val="FF0000"/>
+                  </a:solidFill>
+                  <a:latin typeface="+mj-lt"/>
+                  <a:ea typeface="+mj-ea"/>
+                  <a:cs typeface="+mj-cs"/>
+                </a:rPr>
+                <a:t>Applied Optics and Photonics</a:t>
+              </a:r>
+            </a:p>
+            <a:p>
+              <a:pPr defTabSz="667512">
+                <a:spcAft>
+                  <a:spcPts val="600"/>
+                </a:spcAft>
+              </a:pPr>
+              <a:endParaRPr lang="en-US" sz="700" kern="1200" dirty="0">
                 <a:solidFill>
-                  <a:schemeClr val="tx1"/>
+                  <a:srgbClr val="FFFF00"/>
                 </a:solidFill>
                 <a:latin typeface="+mj-lt"/>
                 <a:ea typeface="+mj-ea"/>
                 <a:cs typeface="+mj-cs"/>
-              </a:defRPr>
-            </a:lvl1pPr>
-          </a:lstStyle>
-          <a:p>
-            <a:r>
-              <a:rPr lang="en-US" dirty="0">
-                <a:solidFill>
-                  <a:srgbClr val="FF0000"/>
-                </a:solidFill>
-              </a:rPr>
-              <a:t>Applied Optics and Photonics (PHYS-335)</a:t>
-            </a:r>
-          </a:p>
-        </p:txBody>
-      </p:sp>
-      <p:sp>
-        <p:nvSpPr>
-          <p:cNvPr id="6" name="TextBox 5">
-            <a:extLst>
-              <a:ext uri="{FF2B5EF4-FFF2-40B4-BE49-F238E27FC236}">
-                <a16:creationId xmlns:a16="http://schemas.microsoft.com/office/drawing/2014/main" id="{4B355081-A993-E667-4D80-513964811A65}"/>
-              </a:ext>
-            </a:extLst>
-          </p:cNvPr>
-          <p:cNvSpPr txBox="1"/>
-          <p:nvPr/>
-        </p:nvSpPr>
-        <p:spPr>
-          <a:xfrm>
-            <a:off x="383406" y="2096669"/>
-            <a:ext cx="4057247" cy="646331"/>
-          </a:xfrm>
-          <a:prstGeom prst="rect">
-            <a:avLst/>
-          </a:prstGeom>
-          <a:noFill/>
-        </p:spPr>
-        <p:txBody>
-          <a:bodyPr wrap="square" rtlCol="0">
-            <a:spAutoFit/>
-          </a:bodyPr>
-          <a:lstStyle/>
-          <a:p>
-            <a:r>
-              <a:rPr lang="en-US" dirty="0">
+              </a:endParaRPr>
+            </a:p>
+            <a:p>
+              <a:pPr defTabSz="667512">
+                <a:spcAft>
+                  <a:spcPts val="600"/>
+                </a:spcAft>
+              </a:pPr>
+              <a:br>
+                <a:rPr lang="en-US" sz="700" kern="1200" dirty="0">
+                  <a:solidFill>
+                    <a:srgbClr val="FFFF00"/>
+                  </a:solidFill>
+                  <a:latin typeface="+mj-lt"/>
+                  <a:ea typeface="+mj-ea"/>
+                  <a:cs typeface="+mj-cs"/>
+                </a:rPr>
+              </a:br>
+              <a:endParaRPr lang="en-US" sz="700" kern="1200" dirty="0">
                 <a:solidFill>
                   <a:srgbClr val="FFFF00"/>
-                </a:solidFill>
-              </a:rPr>
-              <a:t>Counts as a Tech Elective for some engineering majors</a:t>
-            </a:r>
-          </a:p>
-        </p:txBody>
-      </p:sp>
-      <p:sp>
-        <p:nvSpPr>
-          <p:cNvPr id="7" name="Title 1">
-            <a:extLst>
-              <a:ext uri="{FF2B5EF4-FFF2-40B4-BE49-F238E27FC236}">
-                <a16:creationId xmlns:a16="http://schemas.microsoft.com/office/drawing/2014/main" id="{76757FCE-9B8F-CE33-09F8-85A57B92676A}"/>
-              </a:ext>
-            </a:extLst>
-          </p:cNvPr>
-          <p:cNvSpPr txBox="1">
-            <a:spLocks/>
-          </p:cNvSpPr>
-          <p:nvPr/>
-        </p:nvSpPr>
-        <p:spPr>
-          <a:xfrm>
-            <a:off x="4794307" y="1591106"/>
-            <a:ext cx="3318932" cy="1460511"/>
-          </a:xfrm>
-          <a:prstGeom prst="rect">
-            <a:avLst/>
-          </a:prstGeom>
-        </p:spPr>
-        <p:txBody>
-          <a:bodyPr vert="horz" lIns="91440" tIns="45720" rIns="91440" bIns="45720" rtlCol="0" anchor="ctr">
-            <a:normAutofit fontScale="52500" lnSpcReduction="20000"/>
-          </a:bodyPr>
-          <a:lstStyle>
-            <a:lvl1pPr algn="l" defTabSz="914400" rtl="0" eaLnBrk="1" latinLnBrk="0" hangingPunct="1">
-              <a:lnSpc>
-                <a:spcPct val="90000"/>
-              </a:lnSpc>
-              <a:spcBef>
-                <a:spcPct val="0"/>
-              </a:spcBef>
-              <a:buNone/>
-              <a:defRPr sz="4400" kern="1200">
-                <a:solidFill>
-                  <a:schemeClr val="tx1"/>
                 </a:solidFill>
                 <a:latin typeface="+mj-lt"/>
                 <a:ea typeface="+mj-ea"/>
                 <a:cs typeface="+mj-cs"/>
-              </a:defRPr>
-            </a:lvl1pPr>
-          </a:lstStyle>
-          <a:p>
-            <a:pPr>
-              <a:lnSpc>
-                <a:spcPct val="100000"/>
-              </a:lnSpc>
-            </a:pPr>
-            <a:r>
-              <a:rPr lang="en-US" sz="4000" dirty="0"/>
-              <a:t>PHYS-113 </a:t>
-            </a:r>
-            <a:r>
-              <a:rPr lang="en-US" sz="4000" i="1" dirty="0"/>
-              <a:t>Quantum Revolution for Everyone </a:t>
-            </a:r>
-            <a:br>
-              <a:rPr lang="en-US" sz="3600" i="1" dirty="0"/>
-            </a:br>
-            <a:br>
-              <a:rPr lang="en-US" sz="3600" i="1" dirty="0"/>
-            </a:br>
-            <a:br>
-              <a:rPr lang="en-US" sz="2600" i="1" dirty="0"/>
-            </a:br>
-            <a:br>
-              <a:rPr lang="en-US" sz="2600" i="1" dirty="0"/>
-            </a:br>
-            <a:r>
-              <a:rPr lang="en-US" sz="2000" dirty="0"/>
-              <a:t>FA 25, Tu/Th 1:25-2:20 (class), F 12:20-2:20 (lab)</a:t>
-            </a:r>
-            <a:br>
-              <a:rPr lang="en-US" sz="2000" dirty="0"/>
-            </a:br>
-            <a:r>
-              <a:rPr lang="en-US" sz="2000" dirty="0"/>
-              <a:t>Gen Ed: ARNS with lab (3 </a:t>
-            </a:r>
-            <a:r>
-              <a:rPr lang="en-US" sz="2000" dirty="0" err="1"/>
-              <a:t>cr</a:t>
-            </a:r>
-            <a:r>
-              <a:rPr lang="en-US" sz="2000" dirty="0"/>
-              <a:t>), pre-req(s): none</a:t>
-            </a:r>
-            <a:endParaRPr lang="en-US" sz="2000" i="1" dirty="0"/>
-          </a:p>
-        </p:txBody>
-      </p:sp>
+              </a:endParaRPr>
+            </a:p>
+            <a:p>
+              <a:pPr defTabSz="667512">
+                <a:spcAft>
+                  <a:spcPts val="600"/>
+                </a:spcAft>
+              </a:pPr>
+              <a:endParaRPr lang="en-US" sz="700" dirty="0">
+                <a:solidFill>
+                  <a:srgbClr val="FFFF00"/>
+                </a:solidFill>
+              </a:endParaRPr>
+            </a:p>
+            <a:p>
+              <a:pPr defTabSz="667512">
+                <a:spcAft>
+                  <a:spcPts val="600"/>
+                </a:spcAft>
+              </a:pPr>
+              <a:endParaRPr lang="en-US" sz="700" kern="1200" dirty="0">
+                <a:solidFill>
+                  <a:srgbClr val="FFFF00"/>
+                </a:solidFill>
+                <a:latin typeface="+mj-lt"/>
+                <a:ea typeface="+mj-ea"/>
+                <a:cs typeface="+mj-cs"/>
+              </a:endParaRPr>
+            </a:p>
+            <a:p>
+              <a:pPr defTabSz="667512">
+                <a:spcAft>
+                  <a:spcPts val="600"/>
+                </a:spcAft>
+              </a:pPr>
+              <a:endParaRPr lang="en-US" sz="700" dirty="0">
+                <a:solidFill>
+                  <a:srgbClr val="FFFF00"/>
+                </a:solidFill>
+              </a:endParaRPr>
+            </a:p>
+            <a:p>
+              <a:pPr defTabSz="667512">
+                <a:spcAft>
+                  <a:spcPts val="600"/>
+                </a:spcAft>
+              </a:pPr>
+              <a:endParaRPr lang="en-US" sz="700" kern="1200" dirty="0">
+                <a:solidFill>
+                  <a:srgbClr val="FFFF00"/>
+                </a:solidFill>
+                <a:latin typeface="+mj-lt"/>
+                <a:ea typeface="+mj-ea"/>
+                <a:cs typeface="+mj-cs"/>
+              </a:endParaRPr>
+            </a:p>
+            <a:p>
+              <a:pPr defTabSz="667512">
+                <a:spcAft>
+                  <a:spcPts val="600"/>
+                </a:spcAft>
+              </a:pPr>
+              <a:endParaRPr lang="en-US" sz="700" dirty="0">
+                <a:solidFill>
+                  <a:srgbClr val="FFFF00"/>
+                </a:solidFill>
+              </a:endParaRPr>
+            </a:p>
+            <a:p>
+              <a:pPr defTabSz="667512">
+                <a:spcAft>
+                  <a:spcPts val="600"/>
+                </a:spcAft>
+              </a:pPr>
+              <a:endParaRPr lang="en-US" sz="700" kern="1200" dirty="0">
+                <a:solidFill>
+                  <a:srgbClr val="FFFF00"/>
+                </a:solidFill>
+                <a:latin typeface="+mj-lt"/>
+                <a:ea typeface="+mj-ea"/>
+                <a:cs typeface="+mj-cs"/>
+              </a:endParaRPr>
+            </a:p>
+            <a:p>
+              <a:pPr defTabSz="667512">
+                <a:spcAft>
+                  <a:spcPts val="600"/>
+                </a:spcAft>
+              </a:pPr>
+              <a:endParaRPr lang="en-US" sz="700" dirty="0">
+                <a:solidFill>
+                  <a:srgbClr val="FFFF00"/>
+                </a:solidFill>
+              </a:endParaRPr>
+            </a:p>
+            <a:p>
+              <a:pPr defTabSz="667512">
+                <a:spcAft>
+                  <a:spcPts val="600"/>
+                </a:spcAft>
+              </a:pPr>
+              <a:endParaRPr lang="en-US" sz="700" kern="1200" dirty="0">
+                <a:solidFill>
+                  <a:srgbClr val="FFFF00"/>
+                </a:solidFill>
+                <a:latin typeface="+mj-lt"/>
+                <a:ea typeface="+mj-ea"/>
+                <a:cs typeface="+mj-cs"/>
+              </a:endParaRPr>
+            </a:p>
+            <a:p>
+              <a:pPr defTabSz="667512">
+                <a:spcAft>
+                  <a:spcPts val="600"/>
+                </a:spcAft>
+              </a:pPr>
+              <a:endParaRPr lang="en-US" sz="700" dirty="0">
+                <a:solidFill>
+                  <a:srgbClr val="FFFF00"/>
+                </a:solidFill>
+              </a:endParaRPr>
+            </a:p>
+            <a:p>
+              <a:pPr defTabSz="667512">
+                <a:spcAft>
+                  <a:spcPts val="600"/>
+                </a:spcAft>
+              </a:pPr>
+              <a:endParaRPr lang="en-US" sz="700" kern="1200" dirty="0">
+                <a:solidFill>
+                  <a:srgbClr val="FFFF00"/>
+                </a:solidFill>
+                <a:latin typeface="+mj-lt"/>
+                <a:ea typeface="+mj-ea"/>
+                <a:cs typeface="+mj-cs"/>
+              </a:endParaRPr>
+            </a:p>
+            <a:p>
+              <a:pPr defTabSz="667512">
+                <a:spcAft>
+                  <a:spcPts val="600"/>
+                </a:spcAft>
+              </a:pPr>
+              <a:endParaRPr lang="en-US" sz="700" kern="1200" dirty="0">
+                <a:solidFill>
+                  <a:srgbClr val="FFFF00"/>
+                </a:solidFill>
+                <a:latin typeface="+mj-lt"/>
+                <a:ea typeface="+mj-ea"/>
+                <a:cs typeface="+mj-cs"/>
+              </a:endParaRPr>
+            </a:p>
+            <a:p>
+              <a:pPr defTabSz="667512">
+                <a:spcAft>
+                  <a:spcPts val="600"/>
+                </a:spcAft>
+              </a:pPr>
+              <a:endParaRPr lang="en-US" sz="700" kern="1200" dirty="0">
+                <a:solidFill>
+                  <a:srgbClr val="FFFF00"/>
+                </a:solidFill>
+                <a:latin typeface="+mj-lt"/>
+                <a:ea typeface="+mj-ea"/>
+                <a:cs typeface="+mj-cs"/>
+              </a:endParaRPr>
+            </a:p>
+            <a:p>
+              <a:pPr defTabSz="667512">
+                <a:spcAft>
+                  <a:spcPts val="600"/>
+                </a:spcAft>
+              </a:pPr>
+              <a:endParaRPr lang="en-US" sz="700" kern="1200" dirty="0">
+                <a:solidFill>
+                  <a:srgbClr val="FFFF00"/>
+                </a:solidFill>
+                <a:latin typeface="+mj-lt"/>
+                <a:ea typeface="+mj-ea"/>
+                <a:cs typeface="+mj-cs"/>
+              </a:endParaRPr>
+            </a:p>
+            <a:p>
+              <a:pPr defTabSz="667512">
+                <a:spcAft>
+                  <a:spcPts val="600"/>
+                </a:spcAft>
+              </a:pPr>
+              <a:r>
+                <a:rPr lang="en-US" sz="1000" kern="1200" dirty="0">
+                  <a:solidFill>
+                    <a:srgbClr val="FFFF00"/>
+                  </a:solidFill>
+                  <a:latin typeface="+mj-lt"/>
+                  <a:ea typeface="+mj-ea"/>
+                  <a:cs typeface="+mj-cs"/>
+                </a:rPr>
+                <a:t>Counts as a Tech Elective for some engineering majors</a:t>
+              </a:r>
+              <a:endParaRPr lang="en-US" sz="1000" dirty="0">
+                <a:solidFill>
+                  <a:srgbClr val="FFFF00"/>
+                </a:solidFill>
+              </a:endParaRPr>
+            </a:p>
+          </p:txBody>
+        </p:sp>
+      </p:grpSp>
+      <p:grpSp>
+        <p:nvGrpSpPr>
+          <p:cNvPr id="31" name="Group 30">
+            <a:extLst>
+              <a:ext uri="{FF2B5EF4-FFF2-40B4-BE49-F238E27FC236}">
+                <a16:creationId xmlns:a16="http://schemas.microsoft.com/office/drawing/2014/main" id="{35B496ED-3178-089C-F443-AF3C22EBE21D}"/>
+              </a:ext>
+            </a:extLst>
+          </p:cNvPr>
+          <p:cNvGrpSpPr/>
+          <p:nvPr/>
+        </p:nvGrpSpPr>
+        <p:grpSpPr>
+          <a:xfrm>
+            <a:off x="4584699" y="2619784"/>
+            <a:ext cx="3022601" cy="3600041"/>
+            <a:chOff x="8390657" y="1508784"/>
+            <a:chExt cx="3513615" cy="4184859"/>
+          </a:xfrm>
+        </p:grpSpPr>
+        <p:grpSp>
+          <p:nvGrpSpPr>
+            <p:cNvPr id="28" name="Group 27">
+              <a:extLst>
+                <a:ext uri="{FF2B5EF4-FFF2-40B4-BE49-F238E27FC236}">
+                  <a16:creationId xmlns:a16="http://schemas.microsoft.com/office/drawing/2014/main" id="{9516B38A-6930-28CC-0AC4-71C3D171070F}"/>
+                </a:ext>
+              </a:extLst>
+            </p:cNvPr>
+            <p:cNvGrpSpPr/>
+            <p:nvPr/>
+          </p:nvGrpSpPr>
+          <p:grpSpPr>
+            <a:xfrm>
+              <a:off x="8390657" y="1508784"/>
+              <a:ext cx="3513615" cy="4104429"/>
+              <a:chOff x="8390658" y="1508784"/>
+              <a:chExt cx="3040392" cy="3551633"/>
+            </a:xfrm>
+          </p:grpSpPr>
+          <p:pic>
+            <p:nvPicPr>
+              <p:cNvPr id="22" name="Picture 21" descr="A picture containing decorated&#10;&#10;Description automatically generated">
+                <a:extLst>
+                  <a:ext uri="{FF2B5EF4-FFF2-40B4-BE49-F238E27FC236}">
+                    <a16:creationId xmlns:a16="http://schemas.microsoft.com/office/drawing/2014/main" id="{072AB109-1939-98D9-1F44-59C9BA0ED898}"/>
+                  </a:ext>
+                </a:extLst>
+              </p:cNvPr>
+              <p:cNvPicPr>
+                <a:picLocks noChangeAspect="1"/>
+              </p:cNvPicPr>
+              <p:nvPr/>
+            </p:nvPicPr>
+            <p:blipFill rotWithShape="1">
+              <a:blip r:embed="rId3">
+                <a:alphaModFix amt="35000"/>
+              </a:blip>
+              <a:srcRect l="371" r="1722" b="8"/>
+              <a:stretch/>
+            </p:blipFill>
+            <p:spPr>
+              <a:xfrm>
+                <a:off x="8404027" y="1508784"/>
+                <a:ext cx="1516539" cy="1548839"/>
+              </a:xfrm>
+              <a:prstGeom prst="rect">
+                <a:avLst/>
+              </a:prstGeom>
+            </p:spPr>
+          </p:pic>
+          <p:pic>
+            <p:nvPicPr>
+              <p:cNvPr id="23" name="Picture 22" descr="A close-up of several green leaves&#10;&#10;Description automatically generated with low confidence">
+                <a:extLst>
+                  <a:ext uri="{FF2B5EF4-FFF2-40B4-BE49-F238E27FC236}">
+                    <a16:creationId xmlns:a16="http://schemas.microsoft.com/office/drawing/2014/main" id="{D9BA3C19-1591-5B58-0F6F-8956F882F9C8}"/>
+                  </a:ext>
+                </a:extLst>
+              </p:cNvPr>
+              <p:cNvPicPr>
+                <a:picLocks noChangeAspect="1"/>
+              </p:cNvPicPr>
+              <p:nvPr/>
+            </p:nvPicPr>
+            <p:blipFill rotWithShape="1">
+              <a:blip r:embed="rId4">
+                <a:alphaModFix amt="35000"/>
+              </a:blip>
+              <a:srcRect l="18057" r="2139" b="-4"/>
+              <a:stretch/>
+            </p:blipFill>
+            <p:spPr>
+              <a:xfrm>
+                <a:off x="9914511" y="1510839"/>
+                <a:ext cx="1516539" cy="1548839"/>
+              </a:xfrm>
+              <a:prstGeom prst="rect">
+                <a:avLst/>
+              </a:prstGeom>
+            </p:spPr>
+          </p:pic>
+          <p:pic>
+            <p:nvPicPr>
+              <p:cNvPr id="24" name="Picture 23" descr="A picture containing grass, outdoor, fruit, different&#10;&#10;Description automatically generated">
+                <a:extLst>
+                  <a:ext uri="{FF2B5EF4-FFF2-40B4-BE49-F238E27FC236}">
+                    <a16:creationId xmlns:a16="http://schemas.microsoft.com/office/drawing/2014/main" id="{2FED081B-C18C-DDCB-CD49-25F534F5CEA5}"/>
+                  </a:ext>
+                </a:extLst>
+              </p:cNvPr>
+              <p:cNvPicPr>
+                <a:picLocks noChangeAspect="1"/>
+              </p:cNvPicPr>
+              <p:nvPr/>
+            </p:nvPicPr>
+            <p:blipFill rotWithShape="1">
+              <a:blip r:embed="rId5">
+                <a:alphaModFix amt="35000"/>
+              </a:blip>
+              <a:srcRect b="13337"/>
+              <a:stretch/>
+            </p:blipFill>
+            <p:spPr>
+              <a:xfrm>
+                <a:off x="8390658" y="3059400"/>
+                <a:ext cx="3028157" cy="2001017"/>
+              </a:xfrm>
+              <a:prstGeom prst="rect">
+                <a:avLst/>
+              </a:prstGeom>
+            </p:spPr>
+          </p:pic>
+        </p:grpSp>
+        <p:sp>
+          <p:nvSpPr>
+            <p:cNvPr id="11" name="TextBox 10">
+              <a:extLst>
+                <a:ext uri="{FF2B5EF4-FFF2-40B4-BE49-F238E27FC236}">
+                  <a16:creationId xmlns:a16="http://schemas.microsoft.com/office/drawing/2014/main" id="{AC271D97-B1CD-DF4B-3E6C-3D09312C1085}"/>
+                </a:ext>
+              </a:extLst>
+            </p:cNvPr>
+            <p:cNvSpPr txBox="1"/>
+            <p:nvPr/>
+          </p:nvSpPr>
+          <p:spPr>
+            <a:xfrm>
+              <a:off x="8390657" y="1591106"/>
+              <a:ext cx="3499474" cy="1508105"/>
+            </a:xfrm>
+            <a:prstGeom prst="rect">
+              <a:avLst/>
+            </a:prstGeom>
+            <a:noFill/>
+          </p:spPr>
+          <p:txBody>
+            <a:bodyPr wrap="square" rtlCol="0">
+              <a:spAutoFit/>
+            </a:bodyPr>
+            <a:lstStyle/>
+            <a:p>
+              <a:pPr defTabSz="786384">
+                <a:spcAft>
+                  <a:spcPts val="600"/>
+                </a:spcAft>
+              </a:pPr>
+              <a:r>
+                <a:rPr lang="en-US" sz="2064" kern="1200" dirty="0">
+                  <a:solidFill>
+                    <a:schemeClr val="tx1"/>
+                  </a:solidFill>
+                  <a:latin typeface="+mn-lt"/>
+                  <a:ea typeface="+mn-ea"/>
+                  <a:cs typeface="+mn-cs"/>
+                </a:rPr>
+                <a:t>NANO-230 </a:t>
+              </a:r>
+              <a:r>
+                <a:rPr lang="en-US" sz="2064" i="1" kern="1200" dirty="0">
+                  <a:solidFill>
+                    <a:schemeClr val="tx1"/>
+                  </a:solidFill>
+                  <a:latin typeface="+mn-lt"/>
+                  <a:ea typeface="+mn-ea"/>
+                  <a:cs typeface="+mn-cs"/>
+                </a:rPr>
+                <a:t>MICROSCOPY</a:t>
+              </a:r>
+            </a:p>
+            <a:p>
+              <a:pPr defTabSz="786384">
+                <a:spcAft>
+                  <a:spcPts val="600"/>
+                </a:spcAft>
+              </a:pPr>
+              <a:endParaRPr lang="en-US" sz="1548" kern="1200" dirty="0">
+                <a:solidFill>
+                  <a:schemeClr val="tx1"/>
+                </a:solidFill>
+                <a:latin typeface="+mn-lt"/>
+                <a:ea typeface="+mn-ea"/>
+                <a:cs typeface="+mn-cs"/>
+              </a:endParaRPr>
+            </a:p>
+            <a:p>
+              <a:pPr defTabSz="786384">
+                <a:spcAft>
+                  <a:spcPts val="600"/>
+                </a:spcAft>
+              </a:pPr>
+              <a:endParaRPr lang="en-US" sz="1548" kern="1200" dirty="0">
+                <a:solidFill>
+                  <a:schemeClr val="tx1"/>
+                </a:solidFill>
+                <a:latin typeface="+mn-lt"/>
+                <a:ea typeface="+mn-ea"/>
+                <a:cs typeface="+mn-cs"/>
+              </a:endParaRPr>
+            </a:p>
+            <a:p>
+              <a:pPr defTabSz="786384">
+                <a:spcAft>
+                  <a:spcPts val="600"/>
+                </a:spcAft>
+              </a:pPr>
+              <a:r>
+                <a:rPr lang="en-US" sz="1376" kern="1200" dirty="0">
+                  <a:solidFill>
+                    <a:schemeClr val="tx1"/>
+                  </a:solidFill>
+                  <a:latin typeface="+mn-lt"/>
+                  <a:ea typeface="+mn-ea"/>
+                  <a:cs typeface="+mn-cs"/>
+                </a:rPr>
+                <a:t>MW 11:15-12:10 </a:t>
+              </a:r>
+            </a:p>
+            <a:p>
+              <a:pPr defTabSz="786384">
+                <a:spcAft>
+                  <a:spcPts val="600"/>
+                </a:spcAft>
+              </a:pPr>
+              <a:r>
+                <a:rPr lang="en-US" sz="1376" kern="1200" dirty="0">
+                  <a:solidFill>
+                    <a:schemeClr val="tx1"/>
+                  </a:solidFill>
+                  <a:latin typeface="+mn-lt"/>
+                  <a:ea typeface="+mn-ea"/>
+                  <a:cs typeface="+mn-cs"/>
+                </a:rPr>
+                <a:t>Th 10:10-12:10</a:t>
+              </a:r>
+              <a:endParaRPr lang="en-US" sz="1600" dirty="0"/>
+            </a:p>
+          </p:txBody>
+        </p:sp>
+        <p:sp>
+          <p:nvSpPr>
+            <p:cNvPr id="25" name="Rectangle 24">
+              <a:extLst>
+                <a:ext uri="{FF2B5EF4-FFF2-40B4-BE49-F238E27FC236}">
+                  <a16:creationId xmlns:a16="http://schemas.microsoft.com/office/drawing/2014/main" id="{982A596F-8079-6AA1-9AAD-800DB62147D3}"/>
+                </a:ext>
+              </a:extLst>
+            </p:cNvPr>
+            <p:cNvSpPr/>
+            <p:nvPr/>
+          </p:nvSpPr>
+          <p:spPr>
+            <a:xfrm>
+              <a:off x="8390657" y="3403153"/>
+              <a:ext cx="3499475" cy="2290490"/>
+            </a:xfrm>
+            <a:prstGeom prst="rect">
+              <a:avLst/>
+            </a:prstGeom>
+          </p:spPr>
+          <p:txBody>
+            <a:bodyPr vert="horz" lIns="91440" tIns="45720" rIns="91440" bIns="45720" rtlCol="0" anchor="t">
+              <a:normAutofit/>
+            </a:bodyPr>
+            <a:lstStyle/>
+            <a:p>
+              <a:pPr defTabSz="786384">
+                <a:lnSpc>
+                  <a:spcPct val="90000"/>
+                </a:lnSpc>
+                <a:spcBef>
+                  <a:spcPct val="0"/>
+                </a:spcBef>
+                <a:spcAft>
+                  <a:spcPct val="35000"/>
+                </a:spcAft>
+              </a:pPr>
+              <a:r>
+                <a:rPr lang="en-US" sz="1032" kern="1200">
+                  <a:solidFill>
+                    <a:schemeClr val="tx1"/>
+                  </a:solidFill>
+                  <a:latin typeface="+mn-lt"/>
+                  <a:ea typeface="+mn-ea"/>
+                  <a:cs typeface="+mn-cs"/>
+                </a:rPr>
+                <a:t>Optical, electron, scanning probe microscopy; Dynamic light scattering, diffraction, emission spectroscopy. Learn techniques to observe nanoscale molecules and materials.</a:t>
+              </a:r>
+            </a:p>
+            <a:p>
+              <a:pPr defTabSz="786384">
+                <a:lnSpc>
+                  <a:spcPct val="90000"/>
+                </a:lnSpc>
+                <a:spcBef>
+                  <a:spcPct val="0"/>
+                </a:spcBef>
+                <a:spcAft>
+                  <a:spcPct val="35000"/>
+                </a:spcAft>
+              </a:pPr>
+              <a:endParaRPr lang="en-US" sz="1032" kern="1200">
+                <a:solidFill>
+                  <a:schemeClr val="tx1"/>
+                </a:solidFill>
+                <a:latin typeface="+mn-lt"/>
+                <a:ea typeface="+mn-ea"/>
+                <a:cs typeface="+mn-cs"/>
+              </a:endParaRPr>
+            </a:p>
+            <a:p>
+              <a:pPr defTabSz="786384">
+                <a:lnSpc>
+                  <a:spcPct val="90000"/>
+                </a:lnSpc>
+                <a:spcBef>
+                  <a:spcPct val="0"/>
+                </a:spcBef>
+                <a:spcAft>
+                  <a:spcPct val="35000"/>
+                </a:spcAft>
+              </a:pPr>
+              <a:endParaRPr lang="en-US" sz="1032" kern="1200">
+                <a:solidFill>
+                  <a:schemeClr val="tx1"/>
+                </a:solidFill>
+                <a:latin typeface="+mn-lt"/>
+                <a:ea typeface="+mn-ea"/>
+                <a:cs typeface="+mn-cs"/>
+              </a:endParaRPr>
+            </a:p>
+            <a:p>
+              <a:pPr defTabSz="786384">
+                <a:lnSpc>
+                  <a:spcPct val="90000"/>
+                </a:lnSpc>
+                <a:spcBef>
+                  <a:spcPct val="0"/>
+                </a:spcBef>
+                <a:spcAft>
+                  <a:spcPct val="35000"/>
+                </a:spcAft>
+              </a:pPr>
+              <a:endParaRPr lang="en-US" sz="1032" kern="1200">
+                <a:solidFill>
+                  <a:schemeClr val="tx1"/>
+                </a:solidFill>
+                <a:latin typeface="+mn-lt"/>
+                <a:ea typeface="+mn-ea"/>
+                <a:cs typeface="+mn-cs"/>
+              </a:endParaRPr>
+            </a:p>
+            <a:p>
+              <a:pPr defTabSz="786384">
+                <a:lnSpc>
+                  <a:spcPct val="90000"/>
+                </a:lnSpc>
+                <a:spcBef>
+                  <a:spcPct val="0"/>
+                </a:spcBef>
+                <a:spcAft>
+                  <a:spcPct val="35000"/>
+                </a:spcAft>
+              </a:pPr>
+              <a:endParaRPr lang="en-US" sz="1032" kern="1200">
+                <a:solidFill>
+                  <a:schemeClr val="tx1"/>
+                </a:solidFill>
+                <a:latin typeface="+mn-lt"/>
+                <a:ea typeface="+mn-ea"/>
+                <a:cs typeface="+mn-cs"/>
+              </a:endParaRPr>
+            </a:p>
+            <a:p>
+              <a:pPr defTabSz="786384">
+                <a:lnSpc>
+                  <a:spcPct val="90000"/>
+                </a:lnSpc>
+                <a:spcBef>
+                  <a:spcPct val="0"/>
+                </a:spcBef>
+                <a:spcAft>
+                  <a:spcPct val="35000"/>
+                </a:spcAft>
+              </a:pPr>
+              <a:endParaRPr lang="en-US" sz="1032" kern="1200">
+                <a:solidFill>
+                  <a:schemeClr val="tx1"/>
+                </a:solidFill>
+                <a:latin typeface="+mn-lt"/>
+                <a:ea typeface="+mn-ea"/>
+                <a:cs typeface="+mn-cs"/>
+              </a:endParaRPr>
+            </a:p>
+            <a:p>
+              <a:pPr defTabSz="786384">
+                <a:lnSpc>
+                  <a:spcPct val="90000"/>
+                </a:lnSpc>
+                <a:spcBef>
+                  <a:spcPct val="0"/>
+                </a:spcBef>
+                <a:spcAft>
+                  <a:spcPct val="35000"/>
+                </a:spcAft>
+              </a:pPr>
+              <a:r>
+                <a:rPr lang="en-US" sz="1548" kern="1200">
+                  <a:solidFill>
+                    <a:schemeClr val="tx1"/>
+                  </a:solidFill>
+                  <a:latin typeface="+mn-lt"/>
+                  <a:ea typeface="+mn-ea"/>
+                  <a:cs typeface="+mn-cs"/>
+                </a:rPr>
+                <a:t>P:  CHEM-135 or NANO-101  </a:t>
+              </a:r>
+              <a:endParaRPr lang="en-US"/>
+            </a:p>
+          </p:txBody>
+        </p:sp>
+      </p:grpSp>
       <p:pic>
         <p:nvPicPr>
           <p:cNvPr id="8" name="Picture 2" descr="Graphical user interface, application&#10;&#10;Description automatically generated">
@@ -4458,7 +5169,8 @@
           <p:nvPr/>
         </p:nvPicPr>
         <p:blipFill rotWithShape="1">
-          <a:blip r:embed="rId3">
+          <a:blip r:embed="rId6">
+            <a:alphaModFix amt="35000"/>
             <a:extLst>
               <a:ext uri="{28A0092B-C50C-407E-A947-70E740481C1C}">
                 <a14:useLocalDpi xmlns:a14="http://schemas.microsoft.com/office/drawing/2010/main" val="0"/>
@@ -4470,8 +5182,8 @@
         </p:blipFill>
         <p:spPr bwMode="auto">
           <a:xfrm>
-            <a:off x="4794307" y="2916669"/>
-            <a:ext cx="2953197" cy="3028904"/>
+            <a:off x="8265271" y="2619784"/>
+            <a:ext cx="3510058" cy="3600040"/>
           </a:xfrm>
           <a:custGeom>
             <a:avLst/>
@@ -4637,7 +5349,7 @@
           <p:nvPr/>
         </p:nvPicPr>
         <p:blipFill rotWithShape="1">
-          <a:blip r:embed="rId4">
+          <a:blip r:embed="rId7">
             <a:extLst>
               <a:ext uri="{28A0092B-C50C-407E-A947-70E740481C1C}">
                 <a14:useLocalDpi xmlns:a14="http://schemas.microsoft.com/office/drawing/2010/main" val="0"/>
@@ -4649,8 +5361,8 @@
         </p:blipFill>
         <p:spPr bwMode="auto">
           <a:xfrm>
-            <a:off x="3462798" y="4233523"/>
-            <a:ext cx="3827007" cy="2061168"/>
+            <a:off x="8791357" y="4730248"/>
+            <a:ext cx="2457887" cy="1323780"/>
           </a:xfrm>
           <a:custGeom>
             <a:avLst/>
@@ -4806,83 +5518,211 @@
       </p:pic>
       <p:sp>
         <p:nvSpPr>
-          <p:cNvPr id="10" name="TextBox 9">
+          <p:cNvPr id="7" name="Title 1">
             <a:extLst>
               <a:ext uri="{FF2B5EF4-FFF2-40B4-BE49-F238E27FC236}">
-                <a16:creationId xmlns:a16="http://schemas.microsoft.com/office/drawing/2014/main" id="{1EE4437F-3F84-F0E2-D8DB-AA51AC6908BD}"/>
+                <a16:creationId xmlns:a16="http://schemas.microsoft.com/office/drawing/2014/main" id="{76757FCE-9B8F-CE33-09F8-85A57B92676A}"/>
               </a:ext>
             </a:extLst>
           </p:cNvPr>
-          <p:cNvSpPr txBox="1"/>
+          <p:cNvSpPr txBox="1">
+            <a:spLocks/>
+          </p:cNvSpPr>
           <p:nvPr/>
         </p:nvSpPr>
         <p:spPr>
           <a:xfrm>
-            <a:off x="2867305" y="6363585"/>
-            <a:ext cx="6807200" cy="369332"/>
+            <a:off x="8843068" y="2619784"/>
+            <a:ext cx="2727083" cy="2221157"/>
           </a:xfrm>
           <a:prstGeom prst="rect">
             <a:avLst/>
           </a:prstGeom>
-          <a:noFill/>
         </p:spPr>
         <p:txBody>
-          <a:bodyPr wrap="square" rtlCol="0">
-            <a:spAutoFit/>
+          <a:bodyPr vert="horz" lIns="91440" tIns="45720" rIns="91440" bIns="45720" rtlCol="0" anchor="ctr">
+            <a:normAutofit/>
           </a:bodyPr>
-          <a:lstStyle/>
-          <a:p>
-            <a:r>
-              <a:rPr lang="en-US" dirty="0"/>
-              <a:t>All classes count towards physics major and physics minor</a:t>
-            </a:r>
-          </a:p>
-        </p:txBody>
-      </p:sp>
-      <p:sp>
-        <p:nvSpPr>
-          <p:cNvPr id="11" name="TextBox 10">
-            <a:extLst>
-              <a:ext uri="{FF2B5EF4-FFF2-40B4-BE49-F238E27FC236}">
-                <a16:creationId xmlns:a16="http://schemas.microsoft.com/office/drawing/2014/main" id="{AC271D97-B1CD-DF4B-3E6C-3D09312C1085}"/>
-              </a:ext>
-            </a:extLst>
-          </p:cNvPr>
-          <p:cNvSpPr txBox="1"/>
-          <p:nvPr/>
-        </p:nvSpPr>
-        <p:spPr>
-          <a:xfrm>
-            <a:off x="8619067" y="1591106"/>
-            <a:ext cx="2929466" cy="1754326"/>
-          </a:xfrm>
-          <a:prstGeom prst="rect">
-            <a:avLst/>
-          </a:prstGeom>
-          <a:noFill/>
-        </p:spPr>
-        <p:txBody>
-          <a:bodyPr wrap="square" rtlCol="0">
-            <a:spAutoFit/>
-          </a:bodyPr>
-          <a:lstStyle/>
-          <a:p>
-            <a:r>
-              <a:rPr lang="en-US" dirty="0"/>
-              <a:t>NANO-230 – Microscopy and Materials Characterization</a:t>
-            </a:r>
-          </a:p>
-          <a:p>
-            <a:endParaRPr lang="en-US" dirty="0"/>
-          </a:p>
-          <a:p>
-            <a:endParaRPr lang="en-US" dirty="0"/>
-          </a:p>
-          <a:p>
-            <a:r>
-              <a:rPr lang="en-US" dirty="0"/>
-              <a:t>FA 25: MW 11:15-12:10 and lab Th 10:10-12:10</a:t>
-            </a:r>
+          <a:lstStyle>
+            <a:lvl1pPr algn="l" defTabSz="914400" rtl="0" eaLnBrk="1" latinLnBrk="0" hangingPunct="1">
+              <a:lnSpc>
+                <a:spcPct val="90000"/>
+              </a:lnSpc>
+              <a:spcBef>
+                <a:spcPct val="0"/>
+              </a:spcBef>
+              <a:buNone/>
+              <a:defRPr sz="4400" kern="1200">
+                <a:solidFill>
+                  <a:schemeClr val="tx1"/>
+                </a:solidFill>
+                <a:latin typeface="+mj-lt"/>
+                <a:ea typeface="+mj-ea"/>
+                <a:cs typeface="+mj-cs"/>
+              </a:defRPr>
+            </a:lvl1pPr>
+          </a:lstStyle>
+          <a:p>
+            <a:pPr defTabSz="585216">
+              <a:spcAft>
+                <a:spcPts val="600"/>
+              </a:spcAft>
+            </a:pPr>
+            <a:r>
+              <a:rPr lang="en-US" sz="2000" kern="1200" dirty="0">
+                <a:solidFill>
+                  <a:schemeClr val="tx1"/>
+                </a:solidFill>
+                <a:latin typeface="+mj-lt"/>
+                <a:ea typeface="+mj-ea"/>
+                <a:cs typeface="+mj-cs"/>
+              </a:rPr>
+              <a:t>PHYS-113 </a:t>
+            </a:r>
+            <a:r>
+              <a:rPr lang="en-US" sz="2000" i="1" kern="1200" dirty="0">
+                <a:solidFill>
+                  <a:schemeClr val="tx1"/>
+                </a:solidFill>
+                <a:latin typeface="+mj-lt"/>
+                <a:ea typeface="+mj-ea"/>
+                <a:cs typeface="+mj-cs"/>
+              </a:rPr>
+              <a:t>Quantum Revolution for Everyone</a:t>
+            </a:r>
+          </a:p>
+          <a:p>
+            <a:pPr defTabSz="585216">
+              <a:spcAft>
+                <a:spcPts val="600"/>
+              </a:spcAft>
+            </a:pPr>
+            <a:endParaRPr lang="en-US" sz="2000" i="1" dirty="0"/>
+          </a:p>
+          <a:p>
+            <a:pPr defTabSz="585216">
+              <a:spcAft>
+                <a:spcPts val="600"/>
+              </a:spcAft>
+            </a:pPr>
+            <a:endParaRPr lang="en-US" sz="2000" i="1" kern="1200" dirty="0">
+              <a:solidFill>
+                <a:schemeClr val="tx1"/>
+              </a:solidFill>
+              <a:latin typeface="+mj-lt"/>
+              <a:ea typeface="+mj-ea"/>
+              <a:cs typeface="+mj-cs"/>
+            </a:endParaRPr>
+          </a:p>
+          <a:p>
+            <a:pPr defTabSz="585216">
+              <a:spcAft>
+                <a:spcPts val="600"/>
+              </a:spcAft>
+            </a:pPr>
+            <a:r>
+              <a:rPr lang="en-US" sz="700" i="1" kern="1200" dirty="0">
+                <a:solidFill>
+                  <a:schemeClr val="tx1"/>
+                </a:solidFill>
+                <a:latin typeface="+mj-lt"/>
+                <a:ea typeface="+mj-ea"/>
+                <a:cs typeface="+mj-cs"/>
+              </a:rPr>
+              <a:t> </a:t>
+            </a:r>
+            <a:br>
+              <a:rPr lang="en-US" sz="700" i="1" kern="1200" dirty="0">
+                <a:solidFill>
+                  <a:schemeClr val="tx1"/>
+                </a:solidFill>
+                <a:latin typeface="+mj-lt"/>
+                <a:ea typeface="+mj-ea"/>
+                <a:cs typeface="+mj-cs"/>
+              </a:rPr>
+            </a:br>
+            <a:br>
+              <a:rPr lang="en-US" sz="700" i="1" kern="1200" dirty="0">
+                <a:solidFill>
+                  <a:schemeClr val="tx1"/>
+                </a:solidFill>
+                <a:latin typeface="+mj-lt"/>
+                <a:ea typeface="+mj-ea"/>
+                <a:cs typeface="+mj-cs"/>
+              </a:rPr>
+            </a:br>
+            <a:br>
+              <a:rPr lang="en-US" sz="700" i="1" kern="1200" dirty="0">
+                <a:solidFill>
+                  <a:schemeClr val="tx1"/>
+                </a:solidFill>
+                <a:latin typeface="+mj-lt"/>
+                <a:ea typeface="+mj-ea"/>
+                <a:cs typeface="+mj-cs"/>
+              </a:rPr>
+            </a:br>
+            <a:r>
+              <a:rPr lang="en-US" sz="1000" kern="1200" dirty="0">
+                <a:solidFill>
+                  <a:schemeClr val="tx1"/>
+                </a:solidFill>
+                <a:latin typeface="+mj-lt"/>
+                <a:ea typeface="+mj-ea"/>
+                <a:cs typeface="+mj-cs"/>
+              </a:rPr>
+              <a:t>Tu/Th 1:25-2:20 (class), F 12:20-2:20 (lab)</a:t>
+            </a:r>
+          </a:p>
+          <a:p>
+            <a:pPr defTabSz="585216">
+              <a:spcAft>
+                <a:spcPts val="600"/>
+              </a:spcAft>
+            </a:pPr>
+            <a:br>
+              <a:rPr lang="en-US" sz="1000" kern="1200" dirty="0">
+                <a:solidFill>
+                  <a:schemeClr val="tx1"/>
+                </a:solidFill>
+                <a:latin typeface="+mj-lt"/>
+                <a:ea typeface="+mj-ea"/>
+                <a:cs typeface="+mj-cs"/>
+              </a:rPr>
+            </a:br>
+            <a:r>
+              <a:rPr lang="en-US" sz="1000" kern="1200" dirty="0">
+                <a:solidFill>
+                  <a:schemeClr val="tx1"/>
+                </a:solidFill>
+                <a:latin typeface="+mj-lt"/>
+                <a:ea typeface="+mj-ea"/>
+                <a:cs typeface="+mj-cs"/>
+              </a:rPr>
+              <a:t>Gen Ed: ARNS with lab (3 </a:t>
+            </a:r>
+            <a:r>
+              <a:rPr lang="en-US" sz="1000" kern="1200" dirty="0" err="1">
+                <a:solidFill>
+                  <a:schemeClr val="tx1"/>
+                </a:solidFill>
+                <a:latin typeface="+mj-lt"/>
+                <a:ea typeface="+mj-ea"/>
+                <a:cs typeface="+mj-cs"/>
+              </a:rPr>
+              <a:t>cr</a:t>
+            </a:r>
+            <a:r>
+              <a:rPr lang="en-US" sz="1000" kern="1200" dirty="0">
+                <a:solidFill>
+                  <a:schemeClr val="tx1"/>
+                </a:solidFill>
+                <a:latin typeface="+mj-lt"/>
+                <a:ea typeface="+mj-ea"/>
+                <a:cs typeface="+mj-cs"/>
+              </a:rPr>
+              <a:t>), pre-req(s): none</a:t>
+            </a:r>
+            <a:endParaRPr lang="en-US" sz="1000" i="1" dirty="0"/>
           </a:p>
         </p:txBody>
       </p:sp>

</xml_diff>